<commit_message>
changes in func 10 - 11
</commit_message>
<xml_diff>
--- a/ppt/001 - DataTypes.pptx
+++ b/ppt/001 - DataTypes.pptx
@@ -43,8 +43,8 @@
     <p:sldId id="278" r:id="rId34"/>
     <p:sldId id="279" r:id="rId35"/>
     <p:sldId id="307" r:id="rId36"/>
-    <p:sldId id="280" r:id="rId37"/>
-    <p:sldId id="306" r:id="rId38"/>
+    <p:sldId id="306" r:id="rId37"/>
+    <p:sldId id="280" r:id="rId38"/>
     <p:sldId id="281" r:id="rId39"/>
     <p:sldId id="282" r:id="rId40"/>
     <p:sldId id="283" r:id="rId41"/>
@@ -5370,7 +5370,7 @@
           </a:ln>
           <a:extLst>
             <a:ext uri="{C572A759-6A51-4108-AA02-DFA0A04FC94B}">
-              <ma14:wrappingTextBoxFlag xmlns="" xmlns:m="http://schemas.openxmlformats.org/officeDocument/2006/math" xmlns:a14="http://schemas.microsoft.com/office/drawing/2010/main" xmlns:ma14="http://schemas.microsoft.com/office/mac/drawingml/2011/main" val="1"/>
+              <ma14:wrappingTextBoxFlag xmlns:ma14="http://schemas.microsoft.com/office/mac/drawingml/2011/main" xmlns:a14="http://schemas.microsoft.com/office/drawing/2010/main" xmlns:m="http://schemas.openxmlformats.org/officeDocument/2006/math" xmlns="" val="1"/>
             </a:ext>
           </a:extLst>
         </p:spPr>
@@ -5409,7 +5409,7 @@
           </a:ln>
           <a:extLst>
             <a:ext uri="{C572A759-6A51-4108-AA02-DFA0A04FC94B}">
-              <ma14:wrappingTextBoxFlag xmlns="" xmlns:m="http://schemas.openxmlformats.org/officeDocument/2006/math" xmlns:a14="http://schemas.microsoft.com/office/drawing/2010/main" xmlns:ma14="http://schemas.microsoft.com/office/mac/drawingml/2011/main" val="1"/>
+              <ma14:wrappingTextBoxFlag xmlns:ma14="http://schemas.microsoft.com/office/mac/drawingml/2011/main" xmlns:a14="http://schemas.microsoft.com/office/drawing/2010/main" xmlns:m="http://schemas.openxmlformats.org/officeDocument/2006/math" xmlns="" val="1"/>
             </a:ext>
           </a:extLst>
         </p:spPr>
@@ -6372,7 +6372,7 @@
             <a:effectLst/>
             <a:extLst>
               <a:ext uri="{C572A759-6A51-4108-AA02-DFA0A04FC94B}">
-                <ma14:wrappingTextBoxFlag xmlns="" xmlns:m="http://schemas.openxmlformats.org/officeDocument/2006/math" xmlns:a14="http://schemas.microsoft.com/office/drawing/2010/main" xmlns:ma14="http://schemas.microsoft.com/office/mac/drawingml/2011/main" val="1"/>
+                <ma14:wrappingTextBoxFlag xmlns:ma14="http://schemas.microsoft.com/office/mac/drawingml/2011/main" xmlns:a14="http://schemas.microsoft.com/office/drawing/2010/main" xmlns:m="http://schemas.openxmlformats.org/officeDocument/2006/math" xmlns="" val="1"/>
               </a:ext>
             </a:extLst>
           </p:spPr>
@@ -6458,7 +6458,7 @@
           </a:ln>
           <a:extLst>
             <a:ext uri="{C572A759-6A51-4108-AA02-DFA0A04FC94B}">
-              <ma14:wrappingTextBoxFlag xmlns="" xmlns:m="http://schemas.openxmlformats.org/officeDocument/2006/math" xmlns:a14="http://schemas.microsoft.com/office/drawing/2010/main" xmlns:ma14="http://schemas.microsoft.com/office/mac/drawingml/2011/main" val="1"/>
+              <ma14:wrappingTextBoxFlag xmlns:ma14="http://schemas.microsoft.com/office/mac/drawingml/2011/main" xmlns:a14="http://schemas.microsoft.com/office/drawing/2010/main" xmlns:m="http://schemas.openxmlformats.org/officeDocument/2006/math" xmlns="" val="1"/>
             </a:ext>
           </a:extLst>
         </p:spPr>
@@ -6531,7 +6531,7 @@
           </a:ln>
           <a:extLst>
             <a:ext uri="{C572A759-6A51-4108-AA02-DFA0A04FC94B}">
-              <ma14:wrappingTextBoxFlag xmlns="" xmlns:m="http://schemas.openxmlformats.org/officeDocument/2006/math" xmlns:a14="http://schemas.microsoft.com/office/drawing/2010/main" xmlns:ma14="http://schemas.microsoft.com/office/mac/drawingml/2011/main" val="1"/>
+              <ma14:wrappingTextBoxFlag xmlns:ma14="http://schemas.microsoft.com/office/mac/drawingml/2011/main" xmlns:a14="http://schemas.microsoft.com/office/drawing/2010/main" xmlns:m="http://schemas.openxmlformats.org/officeDocument/2006/math" xmlns="" val="1"/>
             </a:ext>
           </a:extLst>
         </p:spPr>
@@ -6999,7 +6999,7 @@
             <a:effectLst/>
             <a:extLst>
               <a:ext uri="{C572A759-6A51-4108-AA02-DFA0A04FC94B}">
-                <ma14:wrappingTextBoxFlag xmlns="" xmlns:m="http://schemas.openxmlformats.org/officeDocument/2006/math" xmlns:a14="http://schemas.microsoft.com/office/drawing/2010/main" xmlns:ma14="http://schemas.microsoft.com/office/mac/drawingml/2011/main" val="1"/>
+                <ma14:wrappingTextBoxFlag xmlns:ma14="http://schemas.microsoft.com/office/mac/drawingml/2011/main" xmlns:a14="http://schemas.microsoft.com/office/drawing/2010/main" xmlns:m="http://schemas.openxmlformats.org/officeDocument/2006/math" xmlns="" val="1"/>
               </a:ext>
             </a:extLst>
           </p:spPr>
@@ -7078,7 +7078,7 @@
           </a:ln>
           <a:extLst>
             <a:ext uri="{C572A759-6A51-4108-AA02-DFA0A04FC94B}">
-              <ma14:wrappingTextBoxFlag xmlns="" xmlns:m="http://schemas.openxmlformats.org/officeDocument/2006/math" xmlns:a14="http://schemas.microsoft.com/office/drawing/2010/main" xmlns:ma14="http://schemas.microsoft.com/office/mac/drawingml/2011/main" val="1"/>
+              <ma14:wrappingTextBoxFlag xmlns:ma14="http://schemas.microsoft.com/office/mac/drawingml/2011/main" xmlns:a14="http://schemas.microsoft.com/office/drawing/2010/main" xmlns:m="http://schemas.openxmlformats.org/officeDocument/2006/math" xmlns="" val="1"/>
             </a:ext>
           </a:extLst>
         </p:spPr>
@@ -7151,7 +7151,7 @@
           </a:ln>
           <a:extLst>
             <a:ext uri="{C572A759-6A51-4108-AA02-DFA0A04FC94B}">
-              <ma14:wrappingTextBoxFlag xmlns="" xmlns:m="http://schemas.openxmlformats.org/officeDocument/2006/math" xmlns:a14="http://schemas.microsoft.com/office/drawing/2010/main" xmlns:ma14="http://schemas.microsoft.com/office/mac/drawingml/2011/main" val="1"/>
+              <ma14:wrappingTextBoxFlag xmlns:ma14="http://schemas.microsoft.com/office/mac/drawingml/2011/main" xmlns:a14="http://schemas.microsoft.com/office/drawing/2010/main" xmlns:m="http://schemas.openxmlformats.org/officeDocument/2006/math" xmlns="" val="1"/>
             </a:ext>
           </a:extLst>
         </p:spPr>
@@ -8641,7 +8641,7 @@
           </a:ln>
           <a:extLst>
             <a:ext uri="{C572A759-6A51-4108-AA02-DFA0A04FC94B}">
-              <ma14:wrappingTextBoxFlag xmlns="" xmlns:m="http://schemas.openxmlformats.org/officeDocument/2006/math" xmlns:a14="http://schemas.microsoft.com/office/drawing/2010/main" xmlns:ma14="http://schemas.microsoft.com/office/mac/drawingml/2011/main" val="1"/>
+              <ma14:wrappingTextBoxFlag xmlns:ma14="http://schemas.microsoft.com/office/mac/drawingml/2011/main" xmlns:a14="http://schemas.microsoft.com/office/drawing/2010/main" xmlns:m="http://schemas.openxmlformats.org/officeDocument/2006/math" xmlns="" val="1"/>
             </a:ext>
           </a:extLst>
         </p:spPr>
@@ -8680,7 +8680,7 @@
           </a:ln>
           <a:extLst>
             <a:ext uri="{C572A759-6A51-4108-AA02-DFA0A04FC94B}">
-              <ma14:wrappingTextBoxFlag xmlns="" xmlns:m="http://schemas.openxmlformats.org/officeDocument/2006/math" xmlns:a14="http://schemas.microsoft.com/office/drawing/2010/main" xmlns:ma14="http://schemas.microsoft.com/office/mac/drawingml/2011/main" val="1"/>
+              <ma14:wrappingTextBoxFlag xmlns:ma14="http://schemas.microsoft.com/office/mac/drawingml/2011/main" xmlns:a14="http://schemas.microsoft.com/office/drawing/2010/main" xmlns:m="http://schemas.openxmlformats.org/officeDocument/2006/math" xmlns="" val="1"/>
             </a:ext>
           </a:extLst>
         </p:spPr>
@@ -8722,7 +8722,7 @@
           </a:ln>
           <a:extLst>
             <a:ext uri="{C572A759-6A51-4108-AA02-DFA0A04FC94B}">
-              <ma14:wrappingTextBoxFlag xmlns="" xmlns:m="http://schemas.openxmlformats.org/officeDocument/2006/math" xmlns:a14="http://schemas.microsoft.com/office/drawing/2010/main" xmlns:ma14="http://schemas.microsoft.com/office/mac/drawingml/2011/main" val="1"/>
+              <ma14:wrappingTextBoxFlag xmlns:ma14="http://schemas.microsoft.com/office/mac/drawingml/2011/main" xmlns:a14="http://schemas.microsoft.com/office/drawing/2010/main" xmlns:m="http://schemas.openxmlformats.org/officeDocument/2006/math" xmlns="" val="1"/>
             </a:ext>
           </a:extLst>
         </p:spPr>
@@ -9047,7 +9047,7 @@
           </a:ln>
           <a:extLst>
             <a:ext uri="{C572A759-6A51-4108-AA02-DFA0A04FC94B}">
-              <ma14:wrappingTextBoxFlag xmlns="" xmlns:m="http://schemas.openxmlformats.org/officeDocument/2006/math" xmlns:a14="http://schemas.microsoft.com/office/drawing/2010/main" xmlns:ma14="http://schemas.microsoft.com/office/mac/drawingml/2011/main" val="1"/>
+              <ma14:wrappingTextBoxFlag xmlns:ma14="http://schemas.microsoft.com/office/mac/drawingml/2011/main" xmlns:a14="http://schemas.microsoft.com/office/drawing/2010/main" xmlns:m="http://schemas.openxmlformats.org/officeDocument/2006/math" xmlns="" val="1"/>
             </a:ext>
           </a:extLst>
         </p:spPr>
@@ -9090,7 +9090,7 @@
           </a:ln>
           <a:extLst>
             <a:ext uri="{C572A759-6A51-4108-AA02-DFA0A04FC94B}">
-              <ma14:wrappingTextBoxFlag xmlns="" xmlns:m="http://schemas.openxmlformats.org/officeDocument/2006/math" xmlns:a14="http://schemas.microsoft.com/office/drawing/2010/main" xmlns:ma14="http://schemas.microsoft.com/office/mac/drawingml/2011/main" val="1"/>
+              <ma14:wrappingTextBoxFlag xmlns:ma14="http://schemas.microsoft.com/office/mac/drawingml/2011/main" xmlns:a14="http://schemas.microsoft.com/office/drawing/2010/main" xmlns:m="http://schemas.openxmlformats.org/officeDocument/2006/math" xmlns="" val="1"/>
             </a:ext>
           </a:extLst>
         </p:spPr>
@@ -9132,7 +9132,7 @@
           </a:ln>
           <a:extLst>
             <a:ext uri="{C572A759-6A51-4108-AA02-DFA0A04FC94B}">
-              <ma14:wrappingTextBoxFlag xmlns="" xmlns:m="http://schemas.openxmlformats.org/officeDocument/2006/math" xmlns:a14="http://schemas.microsoft.com/office/drawing/2010/main" xmlns:ma14="http://schemas.microsoft.com/office/mac/drawingml/2011/main" val="1"/>
+              <ma14:wrappingTextBoxFlag xmlns:ma14="http://schemas.microsoft.com/office/mac/drawingml/2011/main" xmlns:a14="http://schemas.microsoft.com/office/drawing/2010/main" xmlns:m="http://schemas.openxmlformats.org/officeDocument/2006/math" xmlns="" val="1"/>
             </a:ext>
           </a:extLst>
         </p:spPr>
@@ -9201,7 +9201,7 @@
           </a:ln>
           <a:extLst>
             <a:ext uri="{C572A759-6A51-4108-AA02-DFA0A04FC94B}">
-              <ma14:wrappingTextBoxFlag xmlns="" xmlns:m="http://schemas.openxmlformats.org/officeDocument/2006/math" xmlns:a14="http://schemas.microsoft.com/office/drawing/2010/main" xmlns:ma14="http://schemas.microsoft.com/office/mac/drawingml/2011/main" val="1"/>
+              <ma14:wrappingTextBoxFlag xmlns:ma14="http://schemas.microsoft.com/office/mac/drawingml/2011/main" xmlns:a14="http://schemas.microsoft.com/office/drawing/2010/main" xmlns:m="http://schemas.openxmlformats.org/officeDocument/2006/math" xmlns="" val="1"/>
             </a:ext>
           </a:extLst>
         </p:spPr>
@@ -10405,7 +10405,7 @@
           </a:ln>
           <a:extLst>
             <a:ext uri="{C572A759-6A51-4108-AA02-DFA0A04FC94B}">
-              <ma14:wrappingTextBoxFlag xmlns="" xmlns:m="http://schemas.openxmlformats.org/officeDocument/2006/math" xmlns:a14="http://schemas.microsoft.com/office/drawing/2010/main" xmlns:ma14="http://schemas.microsoft.com/office/mac/drawingml/2011/main" val="1"/>
+              <ma14:wrappingTextBoxFlag xmlns:ma14="http://schemas.microsoft.com/office/mac/drawingml/2011/main" xmlns:a14="http://schemas.microsoft.com/office/drawing/2010/main" xmlns:m="http://schemas.openxmlformats.org/officeDocument/2006/math" xmlns="" val="1"/>
             </a:ext>
           </a:extLst>
         </p:spPr>
@@ -10444,7 +10444,7 @@
           </a:ln>
           <a:extLst>
             <a:ext uri="{C572A759-6A51-4108-AA02-DFA0A04FC94B}">
-              <ma14:wrappingTextBoxFlag xmlns="" xmlns:m="http://schemas.openxmlformats.org/officeDocument/2006/math" xmlns:a14="http://schemas.microsoft.com/office/drawing/2010/main" xmlns:ma14="http://schemas.microsoft.com/office/mac/drawingml/2011/main" val="1"/>
+              <ma14:wrappingTextBoxFlag xmlns:ma14="http://schemas.microsoft.com/office/mac/drawingml/2011/main" xmlns:a14="http://schemas.microsoft.com/office/drawing/2010/main" xmlns:m="http://schemas.openxmlformats.org/officeDocument/2006/math" xmlns="" val="1"/>
             </a:ext>
           </a:extLst>
         </p:spPr>
@@ -10483,7 +10483,7 @@
           </a:ln>
           <a:extLst>
             <a:ext uri="{C572A759-6A51-4108-AA02-DFA0A04FC94B}">
-              <ma14:wrappingTextBoxFlag xmlns="" xmlns:m="http://schemas.openxmlformats.org/officeDocument/2006/math" xmlns:a14="http://schemas.microsoft.com/office/drawing/2010/main" xmlns:ma14="http://schemas.microsoft.com/office/mac/drawingml/2011/main" val="1"/>
+              <ma14:wrappingTextBoxFlag xmlns:ma14="http://schemas.microsoft.com/office/mac/drawingml/2011/main" xmlns:a14="http://schemas.microsoft.com/office/drawing/2010/main" xmlns:m="http://schemas.openxmlformats.org/officeDocument/2006/math" xmlns="" val="1"/>
             </a:ext>
           </a:extLst>
         </p:spPr>
@@ -10843,7 +10843,7 @@
           </a:ln>
           <a:extLst>
             <a:ext uri="{C572A759-6A51-4108-AA02-DFA0A04FC94B}">
-              <ma14:wrappingTextBoxFlag xmlns="" xmlns:m="http://schemas.openxmlformats.org/officeDocument/2006/math" xmlns:a14="http://schemas.microsoft.com/office/drawing/2010/main" xmlns:ma14="http://schemas.microsoft.com/office/mac/drawingml/2011/main" val="1"/>
+              <ma14:wrappingTextBoxFlag xmlns:ma14="http://schemas.microsoft.com/office/mac/drawingml/2011/main" xmlns:a14="http://schemas.microsoft.com/office/drawing/2010/main" xmlns:m="http://schemas.openxmlformats.org/officeDocument/2006/math" xmlns="" val="1"/>
             </a:ext>
           </a:extLst>
         </p:spPr>
@@ -10957,7 +10957,7 @@
           </a:ln>
           <a:extLst>
             <a:ext uri="{C572A759-6A51-4108-AA02-DFA0A04FC94B}">
-              <ma14:wrappingTextBoxFlag xmlns="" xmlns:m="http://schemas.openxmlformats.org/officeDocument/2006/math" xmlns:a14="http://schemas.microsoft.com/office/drawing/2010/main" xmlns:ma14="http://schemas.microsoft.com/office/mac/drawingml/2011/main" val="1"/>
+              <ma14:wrappingTextBoxFlag xmlns:ma14="http://schemas.microsoft.com/office/mac/drawingml/2011/main" xmlns:a14="http://schemas.microsoft.com/office/drawing/2010/main" xmlns:m="http://schemas.openxmlformats.org/officeDocument/2006/math" xmlns="" val="1"/>
             </a:ext>
           </a:extLst>
         </p:spPr>
@@ -11562,7 +11562,7 @@
           </a:ln>
           <a:extLst>
             <a:ext uri="{C572A759-6A51-4108-AA02-DFA0A04FC94B}">
-              <ma14:wrappingTextBoxFlag xmlns="" xmlns:m="http://schemas.openxmlformats.org/officeDocument/2006/math" xmlns:a14="http://schemas.microsoft.com/office/drawing/2010/main" xmlns:ma14="http://schemas.microsoft.com/office/mac/drawingml/2011/main" val="1"/>
+              <ma14:wrappingTextBoxFlag xmlns:ma14="http://schemas.microsoft.com/office/mac/drawingml/2011/main" xmlns:a14="http://schemas.microsoft.com/office/drawing/2010/main" xmlns:m="http://schemas.openxmlformats.org/officeDocument/2006/math" xmlns="" val="1"/>
             </a:ext>
           </a:extLst>
         </p:spPr>
@@ -13220,7 +13220,7 @@
           </a:ln>
           <a:extLst>
             <a:ext uri="{C572A759-6A51-4108-AA02-DFA0A04FC94B}">
-              <ma14:wrappingTextBoxFlag xmlns="" xmlns:m="http://schemas.openxmlformats.org/officeDocument/2006/math" xmlns:a14="http://schemas.microsoft.com/office/drawing/2010/main" xmlns:ma14="http://schemas.microsoft.com/office/mac/drawingml/2011/main" val="1"/>
+              <ma14:wrappingTextBoxFlag xmlns:ma14="http://schemas.microsoft.com/office/mac/drawingml/2011/main" xmlns:a14="http://schemas.microsoft.com/office/drawing/2010/main" xmlns:m="http://schemas.openxmlformats.org/officeDocument/2006/math" xmlns="" val="1"/>
             </a:ext>
           </a:extLst>
         </p:spPr>
@@ -13769,7 +13769,7 @@
           </a:ln>
           <a:extLst>
             <a:ext uri="{C572A759-6A51-4108-AA02-DFA0A04FC94B}">
-              <ma14:wrappingTextBoxFlag xmlns="" xmlns:m="http://schemas.openxmlformats.org/officeDocument/2006/math" xmlns:a14="http://schemas.microsoft.com/office/drawing/2010/main" xmlns:ma14="http://schemas.microsoft.com/office/mac/drawingml/2011/main" val="1"/>
+              <ma14:wrappingTextBoxFlag xmlns:ma14="http://schemas.microsoft.com/office/mac/drawingml/2011/main" xmlns:a14="http://schemas.microsoft.com/office/drawing/2010/main" xmlns:m="http://schemas.openxmlformats.org/officeDocument/2006/math" xmlns="" val="1"/>
             </a:ext>
           </a:extLst>
         </p:spPr>
@@ -13981,7 +13981,7 @@
           </a:ln>
           <a:extLst>
             <a:ext uri="{C572A759-6A51-4108-AA02-DFA0A04FC94B}">
-              <ma14:wrappingTextBoxFlag xmlns="" xmlns:m="http://schemas.openxmlformats.org/officeDocument/2006/math" xmlns:a14="http://schemas.microsoft.com/office/drawing/2010/main" xmlns:ma14="http://schemas.microsoft.com/office/mac/drawingml/2011/main" val="1"/>
+              <ma14:wrappingTextBoxFlag xmlns:ma14="http://schemas.microsoft.com/office/mac/drawingml/2011/main" xmlns:a14="http://schemas.microsoft.com/office/drawing/2010/main" xmlns:m="http://schemas.openxmlformats.org/officeDocument/2006/math" xmlns="" val="1"/>
             </a:ext>
           </a:extLst>
         </p:spPr>
@@ -14352,7 +14352,7 @@
           </a:ln>
           <a:extLst>
             <a:ext uri="{C572A759-6A51-4108-AA02-DFA0A04FC94B}">
-              <ma14:wrappingTextBoxFlag xmlns="" xmlns:m="http://schemas.openxmlformats.org/officeDocument/2006/math" xmlns:a14="http://schemas.microsoft.com/office/drawing/2010/main" xmlns:ma14="http://schemas.microsoft.com/office/mac/drawingml/2011/main" val="1"/>
+              <ma14:wrappingTextBoxFlag xmlns:ma14="http://schemas.microsoft.com/office/mac/drawingml/2011/main" xmlns:a14="http://schemas.microsoft.com/office/drawing/2010/main" xmlns:m="http://schemas.openxmlformats.org/officeDocument/2006/math" xmlns="" val="1"/>
             </a:ext>
           </a:extLst>
         </p:spPr>
@@ -15066,7 +15066,7 @@
             <a:effectLst/>
             <a:extLst>
               <a:ext uri="{C572A759-6A51-4108-AA02-DFA0A04FC94B}">
-                <ma14:wrappingTextBoxFlag xmlns="" xmlns:m="http://schemas.openxmlformats.org/officeDocument/2006/math" xmlns:a14="http://schemas.microsoft.com/office/drawing/2010/main" xmlns:ma14="http://schemas.microsoft.com/office/mac/drawingml/2011/main" val="1"/>
+                <ma14:wrappingTextBoxFlag xmlns:ma14="http://schemas.microsoft.com/office/mac/drawingml/2011/main" xmlns:a14="http://schemas.microsoft.com/office/drawing/2010/main" xmlns:m="http://schemas.openxmlformats.org/officeDocument/2006/math" xmlns="" val="1"/>
               </a:ext>
             </a:extLst>
           </p:spPr>
@@ -15145,7 +15145,7 @@
           </a:ln>
           <a:extLst>
             <a:ext uri="{C572A759-6A51-4108-AA02-DFA0A04FC94B}">
-              <ma14:wrappingTextBoxFlag xmlns="" xmlns:m="http://schemas.openxmlformats.org/officeDocument/2006/math" xmlns:a14="http://schemas.microsoft.com/office/drawing/2010/main" xmlns:ma14="http://schemas.microsoft.com/office/mac/drawingml/2011/main" val="1"/>
+              <ma14:wrappingTextBoxFlag xmlns:ma14="http://schemas.microsoft.com/office/mac/drawingml/2011/main" xmlns:a14="http://schemas.microsoft.com/office/drawing/2010/main" xmlns:m="http://schemas.openxmlformats.org/officeDocument/2006/math" xmlns="" val="1"/>
             </a:ext>
           </a:extLst>
         </p:spPr>
@@ -15218,7 +15218,7 @@
           </a:ln>
           <a:extLst>
             <a:ext uri="{C572A759-6A51-4108-AA02-DFA0A04FC94B}">
-              <ma14:wrappingTextBoxFlag xmlns="" xmlns:m="http://schemas.openxmlformats.org/officeDocument/2006/math" xmlns:a14="http://schemas.microsoft.com/office/drawing/2010/main" xmlns:ma14="http://schemas.microsoft.com/office/mac/drawingml/2011/main" val="1"/>
+              <ma14:wrappingTextBoxFlag xmlns:ma14="http://schemas.microsoft.com/office/mac/drawingml/2011/main" xmlns:a14="http://schemas.microsoft.com/office/drawing/2010/main" xmlns:m="http://schemas.openxmlformats.org/officeDocument/2006/math" xmlns="" val="1"/>
             </a:ext>
           </a:extLst>
         </p:spPr>
@@ -15315,7 +15315,7 @@
           </a:ln>
           <a:extLst>
             <a:ext uri="{C572A759-6A51-4108-AA02-DFA0A04FC94B}">
-              <ma14:wrappingTextBoxFlag xmlns="" xmlns:m="http://schemas.openxmlformats.org/officeDocument/2006/math" xmlns:a14="http://schemas.microsoft.com/office/drawing/2010/main" xmlns:ma14="http://schemas.microsoft.com/office/mac/drawingml/2011/main" val="1"/>
+              <ma14:wrappingTextBoxFlag xmlns:ma14="http://schemas.microsoft.com/office/mac/drawingml/2011/main" xmlns:a14="http://schemas.microsoft.com/office/drawing/2010/main" xmlns:m="http://schemas.openxmlformats.org/officeDocument/2006/math" xmlns="" val="1"/>
             </a:ext>
           </a:extLst>
         </p:spPr>
@@ -15499,7 +15499,7 @@
           </a:ln>
           <a:extLst>
             <a:ext uri="{C572A759-6A51-4108-AA02-DFA0A04FC94B}">
-              <ma14:wrappingTextBoxFlag xmlns="" xmlns:m="http://schemas.openxmlformats.org/officeDocument/2006/math" xmlns:a14="http://schemas.microsoft.com/office/drawing/2010/main" xmlns:ma14="http://schemas.microsoft.com/office/mac/drawingml/2011/main" val="1"/>
+              <ma14:wrappingTextBoxFlag xmlns:ma14="http://schemas.microsoft.com/office/mac/drawingml/2011/main" xmlns:a14="http://schemas.microsoft.com/office/drawing/2010/main" xmlns:m="http://schemas.openxmlformats.org/officeDocument/2006/math" xmlns="" val="1"/>
             </a:ext>
           </a:extLst>
         </p:spPr>
@@ -15681,7 +15681,7 @@
           </a:ln>
           <a:extLst>
             <a:ext uri="{C572A759-6A51-4108-AA02-DFA0A04FC94B}">
-              <ma14:wrappingTextBoxFlag xmlns="" xmlns:m="http://schemas.openxmlformats.org/officeDocument/2006/math" xmlns:a14="http://schemas.microsoft.com/office/drawing/2010/main" xmlns:ma14="http://schemas.microsoft.com/office/mac/drawingml/2011/main" val="1"/>
+              <ma14:wrappingTextBoxFlag xmlns:ma14="http://schemas.microsoft.com/office/mac/drawingml/2011/main" xmlns:a14="http://schemas.microsoft.com/office/drawing/2010/main" xmlns:m="http://schemas.openxmlformats.org/officeDocument/2006/math" xmlns="" val="1"/>
             </a:ext>
           </a:extLst>
         </p:spPr>
@@ -15698,7 +15698,15 @@
             </a:pPr>
             <a:r>
               <a:rPr lang="en-IN" sz="2400" dirty="0"/>
-              <a:t>Global - Outside {} - ES5</a:t>
+              <a:t>Global - </a:t>
+            </a:r>
+            <a:r>
+              <a:rPr lang="en-IN" sz="2400"/>
+              <a:t>Outside fun </a:t>
+            </a:r>
+            <a:r>
+              <a:rPr lang="en-IN" sz="2400" dirty="0"/>
+              <a:t>- ES5</a:t>
             </a:r>
           </a:p>
           <a:p>
@@ -15709,7 +15717,7 @@
             </a:pPr>
             <a:r>
               <a:rPr lang="en-IN" sz="2400" dirty="0"/>
-              <a:t>Global variables last as long as the application is running</a:t>
+              <a:t>        Global variables last as long as the application is running</a:t>
             </a:r>
           </a:p>
           <a:p>
@@ -15731,7 +15739,7 @@
             </a:pPr>
             <a:r>
               <a:rPr lang="en-IN" sz="2400" dirty="0"/>
-              <a:t>Local variables last as long as a function is running</a:t>
+              <a:t>       Local variables last as long as a function is running</a:t>
             </a:r>
           </a:p>
           <a:p>
@@ -15785,7 +15793,7 @@
           </a:ln>
           <a:extLst>
             <a:ext uri="{C572A759-6A51-4108-AA02-DFA0A04FC94B}">
-              <ma14:wrappingTextBoxFlag xmlns="" xmlns:m="http://schemas.openxmlformats.org/officeDocument/2006/math" xmlns:a14="http://schemas.microsoft.com/office/drawing/2010/main" xmlns:ma14="http://schemas.microsoft.com/office/mac/drawingml/2011/main" val="1"/>
+              <ma14:wrappingTextBoxFlag xmlns:ma14="http://schemas.microsoft.com/office/mac/drawingml/2011/main" xmlns:a14="http://schemas.microsoft.com/office/drawing/2010/main" xmlns:m="http://schemas.openxmlformats.org/officeDocument/2006/math" xmlns="" val="1"/>
             </a:ext>
           </a:extLst>
         </p:spPr>
@@ -16085,602 +16093,6 @@
       </p:grpSpPr>
       <p:pic>
         <p:nvPicPr>
-          <p:cNvPr id="254" name="Google Shape;54;p13" descr="Google Shape;54;p13"/>
-          <p:cNvPicPr>
-            <a:picLocks noChangeAspect="1"/>
-          </p:cNvPicPr>
-          <p:nvPr/>
-        </p:nvPicPr>
-        <p:blipFill>
-          <a:blip r:embed="rId2"/>
-          <a:stretch>
-            <a:fillRect/>
-          </a:stretch>
-        </p:blipFill>
-        <p:spPr>
-          <a:xfrm>
-            <a:off x="0" y="0"/>
-            <a:ext cx="12191997" cy="6858000"/>
-          </a:xfrm>
-          <a:prstGeom prst="rect">
-            <a:avLst/>
-          </a:prstGeom>
-          <a:ln w="12700">
-            <a:miter lim="400000"/>
-          </a:ln>
-        </p:spPr>
-      </p:pic>
-      <p:sp>
-        <p:nvSpPr>
-          <p:cNvPr id="255" name="Rectangle 3"/>
-          <p:cNvSpPr txBox="1"/>
-          <p:nvPr/>
-        </p:nvSpPr>
-        <p:spPr>
-          <a:xfrm>
-            <a:off x="767079" y="1116646"/>
-            <a:ext cx="6004561" cy="2973548"/>
-          </a:xfrm>
-          <a:prstGeom prst="rect">
-            <a:avLst/>
-          </a:prstGeom>
-          <a:ln w="12700">
-            <a:miter lim="400000"/>
-          </a:ln>
-          <a:extLst>
-            <a:ext uri="{C572A759-6A51-4108-AA02-DFA0A04FC94B}">
-              <ma14:wrappingTextBoxFlag xmlns="" xmlns:m="http://schemas.openxmlformats.org/officeDocument/2006/math" xmlns:a14="http://schemas.microsoft.com/office/drawing/2010/main" xmlns:ma14="http://schemas.microsoft.com/office/mac/drawingml/2011/main" val="1"/>
-            </a:ext>
-          </a:extLst>
-        </p:spPr>
-        <p:txBody>
-          <a:bodyPr lIns="45719" rIns="45719">
-            <a:spAutoFit/>
-          </a:bodyPr>
-          <a:lstStyle/>
-          <a:p>
-            <a:pPr>
-              <a:defRPr sz="3200"/>
-            </a:pPr>
-            <a:r>
-              <a:t>function hoist() {</a:t>
-            </a:r>
-          </a:p>
-          <a:p>
-            <a:pPr>
-              <a:defRPr sz="3200"/>
-            </a:pPr>
-            <a:r>
-              <a:t>  console.log(a,b);</a:t>
-            </a:r>
-          </a:p>
-          <a:p>
-            <a:pPr>
-              <a:defRPr sz="3200"/>
-            </a:pPr>
-            <a:r>
-              <a:t>  a = 20;</a:t>
-            </a:r>
-          </a:p>
-          <a:p>
-            <a:pPr>
-              <a:defRPr sz="3200"/>
-            </a:pPr>
-            <a:r>
-              <a:t>  var b = 100;</a:t>
-            </a:r>
-          </a:p>
-          <a:p>
-            <a:pPr>
-              <a:defRPr sz="3200"/>
-            </a:pPr>
-            <a:r>
-              <a:t>  console.log(a,b); </a:t>
-            </a:r>
-          </a:p>
-          <a:p>
-            <a:pPr>
-              <a:defRPr sz="3200"/>
-            </a:pPr>
-            <a:r>
-              <a:t>}</a:t>
-            </a:r>
-          </a:p>
-        </p:txBody>
-      </p:sp>
-      <p:sp>
-        <p:nvSpPr>
-          <p:cNvPr id="256" name="Rectangle 4"/>
-          <p:cNvSpPr txBox="1"/>
-          <p:nvPr/>
-        </p:nvSpPr>
-        <p:spPr>
-          <a:xfrm>
-            <a:off x="4276090" y="4344847"/>
-            <a:ext cx="6004560" cy="2171959"/>
-          </a:xfrm>
-          <a:prstGeom prst="rect">
-            <a:avLst/>
-          </a:prstGeom>
-          <a:ln w="12700">
-            <a:miter lim="400000"/>
-          </a:ln>
-          <a:extLst>
-            <a:ext uri="{C572A759-6A51-4108-AA02-DFA0A04FC94B}">
-              <ma14:wrappingTextBoxFlag xmlns="" xmlns:m="http://schemas.openxmlformats.org/officeDocument/2006/math" xmlns:a14="http://schemas.microsoft.com/office/drawing/2010/main" xmlns:ma14="http://schemas.microsoft.com/office/mac/drawingml/2011/main" val="1"/>
-            </a:ext>
-          </a:extLst>
-        </p:spPr>
-        <p:txBody>
-          <a:bodyPr lIns="45719" rIns="45719">
-            <a:spAutoFit/>
-          </a:bodyPr>
-          <a:lstStyle/>
-          <a:p>
-            <a:pPr>
-              <a:defRPr sz="2800"/>
-            </a:pPr>
-            <a:endParaRPr/>
-          </a:p>
-          <a:p>
-            <a:pPr>
-              <a:defRPr sz="2800"/>
-            </a:pPr>
-            <a:r>
-              <a:t>hoist();</a:t>
-            </a:r>
-          </a:p>
-          <a:p>
-            <a:pPr>
-              <a:defRPr sz="2800"/>
-            </a:pPr>
-            <a:r>
-              <a:t>console.log(a);</a:t>
-            </a:r>
-          </a:p>
-          <a:p>
-            <a:pPr>
-              <a:defRPr sz="2800"/>
-            </a:pPr>
-            <a:r>
-              <a:t>console.log(window.a);</a:t>
-            </a:r>
-          </a:p>
-          <a:p>
-            <a:pPr>
-              <a:defRPr sz="2800"/>
-            </a:pPr>
-            <a:r>
-              <a:t>console.log(b);</a:t>
-            </a:r>
-          </a:p>
-        </p:txBody>
-      </p:sp>
-      <p:sp>
-        <p:nvSpPr>
-          <p:cNvPr id="257" name="Title 1"/>
-          <p:cNvSpPr txBox="1"/>
-          <p:nvPr/>
-        </p:nvSpPr>
-        <p:spPr>
-          <a:xfrm>
-            <a:off x="1046861" y="-279231"/>
-            <a:ext cx="10424161" cy="1325564"/>
-          </a:xfrm>
-          <a:prstGeom prst="rect">
-            <a:avLst/>
-          </a:prstGeom>
-          <a:ln w="12700">
-            <a:miter lim="400000"/>
-          </a:ln>
-          <a:extLst>
-            <a:ext uri="{C572A759-6A51-4108-AA02-DFA0A04FC94B}">
-              <ma14:wrappingTextBoxFlag xmlns="" xmlns:m="http://schemas.openxmlformats.org/officeDocument/2006/math" xmlns:a14="http://schemas.microsoft.com/office/drawing/2010/main" xmlns:ma14="http://schemas.microsoft.com/office/mac/drawingml/2011/main" val="1"/>
-            </a:ext>
-          </a:extLst>
-        </p:spPr>
-        <p:txBody>
-          <a:bodyPr lIns="45719" rIns="45719" anchor="ctr">
-            <a:normAutofit/>
-          </a:bodyPr>
-          <a:lstStyle>
-            <a:lvl1pPr algn="ctr">
-              <a:lnSpc>
-                <a:spcPct val="90000"/>
-              </a:lnSpc>
-              <a:defRPr sz="4400">
-                <a:latin typeface="Calibri Light"/>
-                <a:ea typeface="Calibri Light"/>
-                <a:cs typeface="Calibri Light"/>
-                <a:sym typeface="Calibri Light"/>
-              </a:defRPr>
-            </a:lvl1pPr>
-          </a:lstStyle>
-          <a:p>
-            <a:r>
-              <a:t>Hoisting twisted</a:t>
-            </a:r>
-          </a:p>
-        </p:txBody>
-      </p:sp>
-      <p:sp>
-        <p:nvSpPr>
-          <p:cNvPr id="258" name="Rectangle 8"/>
-          <p:cNvSpPr txBox="1"/>
-          <p:nvPr/>
-        </p:nvSpPr>
-        <p:spPr>
-          <a:xfrm>
-            <a:off x="6863079" y="900617"/>
-            <a:ext cx="6004561" cy="3468848"/>
-          </a:xfrm>
-          <a:prstGeom prst="rect">
-            <a:avLst/>
-          </a:prstGeom>
-          <a:ln w="12700">
-            <a:miter lim="400000"/>
-          </a:ln>
-          <a:extLst>
-            <a:ext uri="{C572A759-6A51-4108-AA02-DFA0A04FC94B}">
-              <ma14:wrappingTextBoxFlag xmlns="" xmlns:m="http://schemas.openxmlformats.org/officeDocument/2006/math" xmlns:a14="http://schemas.microsoft.com/office/drawing/2010/main" xmlns:ma14="http://schemas.microsoft.com/office/mac/drawingml/2011/main" val="1"/>
-            </a:ext>
-          </a:extLst>
-        </p:spPr>
-        <p:txBody>
-          <a:bodyPr lIns="45719" rIns="45719">
-            <a:spAutoFit/>
-          </a:bodyPr>
-          <a:lstStyle/>
-          <a:p>
-            <a:pPr>
-              <a:defRPr sz="3200"/>
-            </a:pPr>
-            <a:r>
-              <a:t>function hoist() {</a:t>
-            </a:r>
-          </a:p>
-          <a:p>
-            <a:pPr>
-              <a:defRPr sz="3200"/>
-            </a:pPr>
-            <a:r>
-              <a:t>   var b = undefined;</a:t>
-            </a:r>
-          </a:p>
-          <a:p>
-            <a:pPr>
-              <a:defRPr sz="3200"/>
-            </a:pPr>
-            <a:r>
-              <a:t>  console.log(a,b);</a:t>
-            </a:r>
-          </a:p>
-          <a:p>
-            <a:pPr>
-              <a:defRPr sz="3200"/>
-            </a:pPr>
-            <a:r>
-              <a:t>  window.a = 20;</a:t>
-            </a:r>
-          </a:p>
-          <a:p>
-            <a:pPr>
-              <a:defRPr sz="3200"/>
-            </a:pPr>
-            <a:r>
-              <a:t>  b = 100;</a:t>
-            </a:r>
-          </a:p>
-          <a:p>
-            <a:pPr>
-              <a:defRPr sz="3200"/>
-            </a:pPr>
-            <a:r>
-              <a:t>  console.log(a,b); </a:t>
-            </a:r>
-          </a:p>
-          <a:p>
-            <a:pPr>
-              <a:defRPr sz="3200"/>
-            </a:pPr>
-            <a:r>
-              <a:t>}</a:t>
-            </a:r>
-          </a:p>
-        </p:txBody>
-      </p:sp>
-      <p:sp>
-        <p:nvSpPr>
-          <p:cNvPr id="259" name="Arrow: Right 9"/>
-          <p:cNvSpPr/>
-          <p:nvPr/>
-        </p:nvSpPr>
-        <p:spPr>
-          <a:xfrm>
-            <a:off x="4487560" y="2144832"/>
-            <a:ext cx="2190308" cy="488247"/>
-          </a:xfrm>
-          <a:prstGeom prst="rightArrow">
-            <a:avLst>
-              <a:gd name="adj1" fmla="val 50000"/>
-              <a:gd name="adj2" fmla="val 50000"/>
-            </a:avLst>
-          </a:prstGeom>
-          <a:gradFill>
-            <a:gsLst>
-              <a:gs pos="0">
-                <a:srgbClr val="C00000"/>
-              </a:gs>
-              <a:gs pos="26000">
-                <a:srgbClr val="C00000"/>
-              </a:gs>
-              <a:gs pos="100000">
-                <a:srgbClr val="C00000"/>
-              </a:gs>
-            </a:gsLst>
-            <a:path path="circle">
-              <a:fillToRect l="-19636" t="62278" r="119636" b="37721"/>
-            </a:path>
-          </a:gradFill>
-          <a:ln w="12700">
-            <a:miter lim="400000"/>
-          </a:ln>
-        </p:spPr>
-        <p:txBody>
-          <a:bodyPr lIns="45719" rIns="45719" anchor="ctr"/>
-          <a:lstStyle/>
-          <a:p>
-            <a:pPr algn="ctr">
-              <a:defRPr>
-                <a:solidFill>
-                  <a:srgbClr val="FFFFFF"/>
-                </a:solidFill>
-              </a:defRPr>
-            </a:pPr>
-            <a:endParaRPr/>
-          </a:p>
-        </p:txBody>
-      </p:sp>
-    </p:spTree>
-  </p:cSld>
-  <p:clrMapOvr>
-    <a:masterClrMapping/>
-  </p:clrMapOvr>
-  <p:transition spd="med"/>
-  <p:timing>
-    <p:tnLst>
-      <p:par>
-        <p:cTn id="1" dur="indefinite" restart="never" fill="hold" nodeType="tmRoot">
-          <p:childTnLst>
-            <p:seq concurrent="1" prevAc="none" nextAc="seek">
-              <p:cTn id="2" dur="indefinite" fill="hold" nodeType="mainSeq">
-                <p:childTnLst>
-                  <p:par>
-                    <p:cTn id="3" fill="hold">
-                      <p:stCondLst>
-                        <p:cond delay="indefinite"/>
-                      </p:stCondLst>
-                      <p:childTnLst>
-                        <p:par>
-                          <p:cTn id="4" fill="hold">
-                            <p:stCondLst>
-                              <p:cond delay="0"/>
-                            </p:stCondLst>
-                            <p:childTnLst>
-                              <p:par>
-                                <p:cTn id="5" presetID="1" presetClass="entr" presetSubtype="0" fill="hold" grpId="1" nodeType="clickEffect">
-                                  <p:stCondLst>
-                                    <p:cond delay="0"/>
-                                  </p:stCondLst>
-                                  <p:iterate>
-                                    <p:tmAbs val="0"/>
-                                  </p:iterate>
-                                  <p:childTnLst>
-                                    <p:set>
-                                      <p:cBhvr>
-                                        <p:cTn id="6" fill="hold"/>
-                                        <p:tgtEl>
-                                          <p:spTgt spid="255"/>
-                                        </p:tgtEl>
-                                        <p:attrNameLst>
-                                          <p:attrName>style.visibility</p:attrName>
-                                        </p:attrNameLst>
-                                      </p:cBhvr>
-                                      <p:to>
-                                        <p:strVal val="visible"/>
-                                      </p:to>
-                                    </p:set>
-                                  </p:childTnLst>
-                                </p:cTn>
-                              </p:par>
-                            </p:childTnLst>
-                          </p:cTn>
-                        </p:par>
-                      </p:childTnLst>
-                    </p:cTn>
-                  </p:par>
-                  <p:par>
-                    <p:cTn id="7" fill="hold">
-                      <p:stCondLst>
-                        <p:cond delay="indefinite"/>
-                      </p:stCondLst>
-                      <p:childTnLst>
-                        <p:par>
-                          <p:cTn id="8" fill="hold">
-                            <p:stCondLst>
-                              <p:cond delay="0"/>
-                            </p:stCondLst>
-                            <p:childTnLst>
-                              <p:par>
-                                <p:cTn id="9" presetID="1" presetClass="entr" presetSubtype="0" fill="hold" grpId="2" nodeType="clickEffect">
-                                  <p:stCondLst>
-                                    <p:cond delay="0"/>
-                                  </p:stCondLst>
-                                  <p:iterate>
-                                    <p:tmAbs val="0"/>
-                                  </p:iterate>
-                                  <p:childTnLst>
-                                    <p:set>
-                                      <p:cBhvr>
-                                        <p:cTn id="10" fill="hold"/>
-                                        <p:tgtEl>
-                                          <p:spTgt spid="259"/>
-                                        </p:tgtEl>
-                                        <p:attrNameLst>
-                                          <p:attrName>style.visibility</p:attrName>
-                                        </p:attrNameLst>
-                                      </p:cBhvr>
-                                      <p:to>
-                                        <p:strVal val="visible"/>
-                                      </p:to>
-                                    </p:set>
-                                  </p:childTnLst>
-                                </p:cTn>
-                              </p:par>
-                            </p:childTnLst>
-                          </p:cTn>
-                        </p:par>
-                      </p:childTnLst>
-                    </p:cTn>
-                  </p:par>
-                  <p:par>
-                    <p:cTn id="11" fill="hold">
-                      <p:stCondLst>
-                        <p:cond delay="indefinite"/>
-                      </p:stCondLst>
-                      <p:childTnLst>
-                        <p:par>
-                          <p:cTn id="12" fill="hold">
-                            <p:stCondLst>
-                              <p:cond delay="0"/>
-                            </p:stCondLst>
-                            <p:childTnLst>
-                              <p:par>
-                                <p:cTn id="13" presetID="1" presetClass="entr" presetSubtype="0" fill="hold" grpId="3" nodeType="clickEffect">
-                                  <p:stCondLst>
-                                    <p:cond delay="0"/>
-                                  </p:stCondLst>
-                                  <p:iterate>
-                                    <p:tmAbs val="0"/>
-                                  </p:iterate>
-                                  <p:childTnLst>
-                                    <p:set>
-                                      <p:cBhvr>
-                                        <p:cTn id="14" fill="hold"/>
-                                        <p:tgtEl>
-                                          <p:spTgt spid="258"/>
-                                        </p:tgtEl>
-                                        <p:attrNameLst>
-                                          <p:attrName>style.visibility</p:attrName>
-                                        </p:attrNameLst>
-                                      </p:cBhvr>
-                                      <p:to>
-                                        <p:strVal val="visible"/>
-                                      </p:to>
-                                    </p:set>
-                                  </p:childTnLst>
-                                </p:cTn>
-                              </p:par>
-                            </p:childTnLst>
-                          </p:cTn>
-                        </p:par>
-                      </p:childTnLst>
-                    </p:cTn>
-                  </p:par>
-                  <p:par>
-                    <p:cTn id="15" fill="hold">
-                      <p:stCondLst>
-                        <p:cond delay="indefinite"/>
-                      </p:stCondLst>
-                      <p:childTnLst>
-                        <p:par>
-                          <p:cTn id="16" fill="hold">
-                            <p:stCondLst>
-                              <p:cond delay="0"/>
-                            </p:stCondLst>
-                            <p:childTnLst>
-                              <p:par>
-                                <p:cTn id="17" presetID="1" presetClass="entr" presetSubtype="0" fill="hold" grpId="4" nodeType="clickEffect">
-                                  <p:stCondLst>
-                                    <p:cond delay="0"/>
-                                  </p:stCondLst>
-                                  <p:iterate>
-                                    <p:tmAbs val="0"/>
-                                  </p:iterate>
-                                  <p:childTnLst>
-                                    <p:set>
-                                      <p:cBhvr>
-                                        <p:cTn id="18" fill="hold"/>
-                                        <p:tgtEl>
-                                          <p:spTgt spid="256"/>
-                                        </p:tgtEl>
-                                        <p:attrNameLst>
-                                          <p:attrName>style.visibility</p:attrName>
-                                        </p:attrNameLst>
-                                      </p:cBhvr>
-                                      <p:to>
-                                        <p:strVal val="visible"/>
-                                      </p:to>
-                                    </p:set>
-                                  </p:childTnLst>
-                                </p:cTn>
-                              </p:par>
-                            </p:childTnLst>
-                          </p:cTn>
-                        </p:par>
-                      </p:childTnLst>
-                    </p:cTn>
-                  </p:par>
-                </p:childTnLst>
-              </p:cTn>
-              <p:prevCondLst>
-                <p:cond evt="onPrev" delay="0">
-                  <p:tgtEl>
-                    <p:sldTgt/>
-                  </p:tgtEl>
-                </p:cond>
-              </p:prevCondLst>
-              <p:nextCondLst>
-                <p:cond evt="onNext" delay="0">
-                  <p:tgtEl>
-                    <p:sldTgt/>
-                  </p:tgtEl>
-                </p:cond>
-              </p:nextCondLst>
-            </p:seq>
-          </p:childTnLst>
-        </p:cTn>
-      </p:par>
-    </p:tnLst>
-    <p:bldLst>
-      <p:bldP spid="255" grpId="1" animBg="1" advAuto="0"/>
-      <p:bldP spid="256" grpId="4" animBg="1" advAuto="0"/>
-      <p:bldP spid="258" grpId="3" animBg="1" advAuto="0"/>
-      <p:bldP spid="259" grpId="2" animBg="1" advAuto="0"/>
-    </p:bldLst>
-  </p:timing>
-</p:sld>
-</file>
-
-<file path=ppt/slides/slide37.xml><?xml version="1.0" encoding="utf-8"?>
-<p:sld xmlns:a="http://schemas.openxmlformats.org/drawingml/2006/main" xmlns:r="http://schemas.openxmlformats.org/officeDocument/2006/relationships" xmlns:p="http://schemas.openxmlformats.org/presentationml/2006/main">
-  <p:cSld>
-    <p:spTree>
-      <p:nvGrpSpPr>
-        <p:cNvPr id="1" name=""/>
-        <p:cNvGrpSpPr/>
-        <p:nvPr/>
-      </p:nvGrpSpPr>
-      <p:grpSpPr>
-        <a:xfrm>
-          <a:off x="0" y="0"/>
-          <a:ext cx="0" cy="0"/>
-          <a:chOff x="0" y="0"/>
-          <a:chExt cx="0" cy="0"/>
-        </a:xfrm>
-      </p:grpSpPr>
-      <p:pic>
-        <p:nvPicPr>
           <p:cNvPr id="247" name="Google Shape;54;p13" descr="Google Shape;54;p13"/>
           <p:cNvPicPr>
             <a:picLocks noChangeAspect="1"/>
@@ -16856,7 +16268,7 @@
           </a:ln>
           <a:extLst>
             <a:ext uri="{C572A759-6A51-4108-AA02-DFA0A04FC94B}">
-              <ma14:wrappingTextBoxFlag xmlns="" xmlns:m="http://schemas.openxmlformats.org/officeDocument/2006/math" xmlns:a14="http://schemas.microsoft.com/office/drawing/2010/main" xmlns:ma14="http://schemas.microsoft.com/office/mac/drawingml/2011/main" val="1"/>
+              <ma14:wrappingTextBoxFlag xmlns:ma14="http://schemas.microsoft.com/office/mac/drawingml/2011/main" xmlns:a14="http://schemas.microsoft.com/office/drawing/2010/main" xmlns:m="http://schemas.openxmlformats.org/officeDocument/2006/math" xmlns="" val="1"/>
             </a:ext>
           </a:extLst>
         </p:spPr>
@@ -16870,7 +16282,16 @@
               <a:defRPr sz="4400"/>
             </a:pPr>
             <a:r>
-              <a:t> console.log(b); </a:t>
+              <a:rPr dirty="0"/>
+              <a:t> </a:t>
+            </a:r>
+            <a:r>
+              <a:rPr dirty="0" err="1"/>
+              <a:t>console.log</a:t>
+            </a:r>
+            <a:r>
+              <a:rPr dirty="0"/>
+              <a:t>(b); </a:t>
             </a:r>
           </a:p>
           <a:p>
@@ -16878,6 +16299,7 @@
               <a:defRPr sz="4400"/>
             </a:pPr>
             <a:r>
+              <a:rPr dirty="0"/>
               <a:t> var b = 100;</a:t>
             </a:r>
           </a:p>
@@ -16886,7 +16308,16 @@
               <a:defRPr sz="4400"/>
             </a:pPr>
             <a:r>
-              <a:t> console.log(b); </a:t>
+              <a:rPr dirty="0"/>
+              <a:t> </a:t>
+            </a:r>
+            <a:r>
+              <a:rPr dirty="0" err="1"/>
+              <a:t>console.log</a:t>
+            </a:r>
+            <a:r>
+              <a:rPr dirty="0"/>
+              <a:t>(b); </a:t>
             </a:r>
           </a:p>
         </p:txBody>
@@ -16910,7 +16341,7 @@
           </a:ln>
           <a:extLst>
             <a:ext uri="{C572A759-6A51-4108-AA02-DFA0A04FC94B}">
-              <ma14:wrappingTextBoxFlag xmlns="" xmlns:m="http://schemas.openxmlformats.org/officeDocument/2006/math" xmlns:a14="http://schemas.microsoft.com/office/drawing/2010/main" xmlns:ma14="http://schemas.microsoft.com/office/mac/drawingml/2011/main" val="1"/>
+              <ma14:wrappingTextBoxFlag xmlns:ma14="http://schemas.microsoft.com/office/mac/drawingml/2011/main" xmlns:a14="http://schemas.microsoft.com/office/drawing/2010/main" xmlns:m="http://schemas.openxmlformats.org/officeDocument/2006/math" xmlns="" val="1"/>
             </a:ext>
           </a:extLst>
         </p:spPr>
@@ -17024,7 +16455,7 @@
           </a:ln>
           <a:extLst>
             <a:ext uri="{C572A759-6A51-4108-AA02-DFA0A04FC94B}">
-              <ma14:wrappingTextBoxFlag xmlns="" xmlns:m="http://schemas.openxmlformats.org/officeDocument/2006/math" xmlns:a14="http://schemas.microsoft.com/office/drawing/2010/main" xmlns:ma14="http://schemas.microsoft.com/office/mac/drawingml/2011/main" val="1"/>
+              <ma14:wrappingTextBoxFlag xmlns:ma14="http://schemas.microsoft.com/office/mac/drawingml/2011/main" xmlns:a14="http://schemas.microsoft.com/office/drawing/2010/main" xmlns:m="http://schemas.openxmlformats.org/officeDocument/2006/math" xmlns="" val="1"/>
             </a:ext>
           </a:extLst>
         </p:spPr>
@@ -17445,6 +16876,664 @@
 </p:sld>
 </file>
 
+<file path=ppt/slides/slide37.xml><?xml version="1.0" encoding="utf-8"?>
+<p:sld xmlns:a="http://schemas.openxmlformats.org/drawingml/2006/main" xmlns:r="http://schemas.openxmlformats.org/officeDocument/2006/relationships" xmlns:p="http://schemas.openxmlformats.org/presentationml/2006/main">
+  <p:cSld>
+    <p:spTree>
+      <p:nvGrpSpPr>
+        <p:cNvPr id="1" name=""/>
+        <p:cNvGrpSpPr/>
+        <p:nvPr/>
+      </p:nvGrpSpPr>
+      <p:grpSpPr>
+        <a:xfrm>
+          <a:off x="0" y="0"/>
+          <a:ext cx="0" cy="0"/>
+          <a:chOff x="0" y="0"/>
+          <a:chExt cx="0" cy="0"/>
+        </a:xfrm>
+      </p:grpSpPr>
+      <p:pic>
+        <p:nvPicPr>
+          <p:cNvPr id="254" name="Google Shape;54;p13" descr="Google Shape;54;p13"/>
+          <p:cNvPicPr>
+            <a:picLocks noChangeAspect="1"/>
+          </p:cNvPicPr>
+          <p:nvPr/>
+        </p:nvPicPr>
+        <p:blipFill>
+          <a:blip r:embed="rId2"/>
+          <a:stretch>
+            <a:fillRect/>
+          </a:stretch>
+        </p:blipFill>
+        <p:spPr>
+          <a:xfrm>
+            <a:off x="0" y="0"/>
+            <a:ext cx="12191997" cy="6858000"/>
+          </a:xfrm>
+          <a:prstGeom prst="rect">
+            <a:avLst/>
+          </a:prstGeom>
+          <a:ln w="12700">
+            <a:miter lim="400000"/>
+          </a:ln>
+        </p:spPr>
+      </p:pic>
+      <p:sp>
+        <p:nvSpPr>
+          <p:cNvPr id="255" name="Rectangle 3"/>
+          <p:cNvSpPr txBox="1"/>
+          <p:nvPr/>
+        </p:nvSpPr>
+        <p:spPr>
+          <a:xfrm>
+            <a:off x="767079" y="1116646"/>
+            <a:ext cx="6004561" cy="2973548"/>
+          </a:xfrm>
+          <a:prstGeom prst="rect">
+            <a:avLst/>
+          </a:prstGeom>
+          <a:ln w="12700">
+            <a:miter lim="400000"/>
+          </a:ln>
+          <a:extLst>
+            <a:ext uri="{C572A759-6A51-4108-AA02-DFA0A04FC94B}">
+              <ma14:wrappingTextBoxFlag xmlns:ma14="http://schemas.microsoft.com/office/mac/drawingml/2011/main" xmlns:a14="http://schemas.microsoft.com/office/drawing/2010/main" xmlns:m="http://schemas.openxmlformats.org/officeDocument/2006/math" xmlns="" val="1"/>
+            </a:ext>
+          </a:extLst>
+        </p:spPr>
+        <p:txBody>
+          <a:bodyPr lIns="45719" rIns="45719">
+            <a:spAutoFit/>
+          </a:bodyPr>
+          <a:lstStyle/>
+          <a:p>
+            <a:pPr>
+              <a:defRPr sz="3200"/>
+            </a:pPr>
+            <a:r>
+              <a:rPr dirty="0"/>
+              <a:t>function hoist() {</a:t>
+            </a:r>
+          </a:p>
+          <a:p>
+            <a:pPr>
+              <a:defRPr sz="3200"/>
+            </a:pPr>
+            <a:r>
+              <a:rPr dirty="0"/>
+              <a:t>  </a:t>
+            </a:r>
+            <a:r>
+              <a:rPr dirty="0" err="1"/>
+              <a:t>console.log</a:t>
+            </a:r>
+            <a:r>
+              <a:rPr dirty="0"/>
+              <a:t>(</a:t>
+            </a:r>
+            <a:r>
+              <a:rPr dirty="0" err="1"/>
+              <a:t>a,b</a:t>
+            </a:r>
+            <a:r>
+              <a:rPr dirty="0"/>
+              <a:t>);</a:t>
+            </a:r>
+          </a:p>
+          <a:p>
+            <a:pPr>
+              <a:defRPr sz="3200"/>
+            </a:pPr>
+            <a:r>
+              <a:rPr dirty="0"/>
+              <a:t>  a = 20;</a:t>
+            </a:r>
+          </a:p>
+          <a:p>
+            <a:pPr>
+              <a:defRPr sz="3200"/>
+            </a:pPr>
+            <a:r>
+              <a:rPr dirty="0"/>
+              <a:t>  var b = 100;</a:t>
+            </a:r>
+          </a:p>
+          <a:p>
+            <a:pPr>
+              <a:defRPr sz="3200"/>
+            </a:pPr>
+            <a:r>
+              <a:rPr dirty="0"/>
+              <a:t>  </a:t>
+            </a:r>
+            <a:r>
+              <a:rPr dirty="0" err="1"/>
+              <a:t>console.log</a:t>
+            </a:r>
+            <a:r>
+              <a:rPr dirty="0"/>
+              <a:t>(</a:t>
+            </a:r>
+            <a:r>
+              <a:rPr dirty="0" err="1"/>
+              <a:t>a,b</a:t>
+            </a:r>
+            <a:r>
+              <a:rPr dirty="0"/>
+              <a:t>); </a:t>
+            </a:r>
+          </a:p>
+          <a:p>
+            <a:pPr>
+              <a:defRPr sz="3200"/>
+            </a:pPr>
+            <a:r>
+              <a:rPr dirty="0"/>
+              <a:t>}</a:t>
+            </a:r>
+          </a:p>
+        </p:txBody>
+      </p:sp>
+      <p:sp>
+        <p:nvSpPr>
+          <p:cNvPr id="256" name="Rectangle 4"/>
+          <p:cNvSpPr txBox="1"/>
+          <p:nvPr/>
+        </p:nvSpPr>
+        <p:spPr>
+          <a:xfrm>
+            <a:off x="4276090" y="4344847"/>
+            <a:ext cx="6004560" cy="2171959"/>
+          </a:xfrm>
+          <a:prstGeom prst="rect">
+            <a:avLst/>
+          </a:prstGeom>
+          <a:ln w="12700">
+            <a:miter lim="400000"/>
+          </a:ln>
+          <a:extLst>
+            <a:ext uri="{C572A759-6A51-4108-AA02-DFA0A04FC94B}">
+              <ma14:wrappingTextBoxFlag xmlns:ma14="http://schemas.microsoft.com/office/mac/drawingml/2011/main" xmlns:a14="http://schemas.microsoft.com/office/drawing/2010/main" xmlns:m="http://schemas.openxmlformats.org/officeDocument/2006/math" xmlns="" val="1"/>
+            </a:ext>
+          </a:extLst>
+        </p:spPr>
+        <p:txBody>
+          <a:bodyPr lIns="45719" rIns="45719">
+            <a:spAutoFit/>
+          </a:bodyPr>
+          <a:lstStyle/>
+          <a:p>
+            <a:pPr>
+              <a:defRPr sz="2800"/>
+            </a:pPr>
+            <a:endParaRPr dirty="0"/>
+          </a:p>
+          <a:p>
+            <a:pPr>
+              <a:defRPr sz="2800"/>
+            </a:pPr>
+            <a:r>
+              <a:rPr dirty="0"/>
+              <a:t>hoist();</a:t>
+            </a:r>
+          </a:p>
+          <a:p>
+            <a:pPr>
+              <a:defRPr sz="2800"/>
+            </a:pPr>
+            <a:r>
+              <a:rPr dirty="0" err="1"/>
+              <a:t>console.log</a:t>
+            </a:r>
+            <a:r>
+              <a:rPr dirty="0"/>
+              <a:t>(a);</a:t>
+            </a:r>
+          </a:p>
+          <a:p>
+            <a:pPr>
+              <a:defRPr sz="2800"/>
+            </a:pPr>
+            <a:r>
+              <a:rPr dirty="0" err="1"/>
+              <a:t>console.log</a:t>
+            </a:r>
+            <a:r>
+              <a:rPr dirty="0"/>
+              <a:t>(</a:t>
+            </a:r>
+            <a:r>
+              <a:rPr dirty="0" err="1"/>
+              <a:t>window.a</a:t>
+            </a:r>
+            <a:r>
+              <a:rPr dirty="0"/>
+              <a:t>);</a:t>
+            </a:r>
+          </a:p>
+          <a:p>
+            <a:pPr>
+              <a:defRPr sz="2800"/>
+            </a:pPr>
+            <a:r>
+              <a:rPr dirty="0" err="1"/>
+              <a:t>console.log</a:t>
+            </a:r>
+            <a:r>
+              <a:rPr dirty="0"/>
+              <a:t>(b);</a:t>
+            </a:r>
+          </a:p>
+        </p:txBody>
+      </p:sp>
+      <p:sp>
+        <p:nvSpPr>
+          <p:cNvPr id="257" name="Title 1"/>
+          <p:cNvSpPr txBox="1"/>
+          <p:nvPr/>
+        </p:nvSpPr>
+        <p:spPr>
+          <a:xfrm>
+            <a:off x="1046861" y="-279231"/>
+            <a:ext cx="10424161" cy="1325564"/>
+          </a:xfrm>
+          <a:prstGeom prst="rect">
+            <a:avLst/>
+          </a:prstGeom>
+          <a:ln w="12700">
+            <a:miter lim="400000"/>
+          </a:ln>
+          <a:extLst>
+            <a:ext uri="{C572A759-6A51-4108-AA02-DFA0A04FC94B}">
+              <ma14:wrappingTextBoxFlag xmlns:ma14="http://schemas.microsoft.com/office/mac/drawingml/2011/main" xmlns:a14="http://schemas.microsoft.com/office/drawing/2010/main" xmlns:m="http://schemas.openxmlformats.org/officeDocument/2006/math" xmlns="" val="1"/>
+            </a:ext>
+          </a:extLst>
+        </p:spPr>
+        <p:txBody>
+          <a:bodyPr lIns="45719" rIns="45719" anchor="ctr">
+            <a:normAutofit/>
+          </a:bodyPr>
+          <a:lstStyle>
+            <a:lvl1pPr algn="ctr">
+              <a:lnSpc>
+                <a:spcPct val="90000"/>
+              </a:lnSpc>
+              <a:defRPr sz="4400">
+                <a:latin typeface="Calibri Light"/>
+                <a:ea typeface="Calibri Light"/>
+                <a:cs typeface="Calibri Light"/>
+                <a:sym typeface="Calibri Light"/>
+              </a:defRPr>
+            </a:lvl1pPr>
+          </a:lstStyle>
+          <a:p>
+            <a:r>
+              <a:t>Hoisting twisted</a:t>
+            </a:r>
+          </a:p>
+        </p:txBody>
+      </p:sp>
+      <p:sp>
+        <p:nvSpPr>
+          <p:cNvPr id="258" name="Rectangle 8"/>
+          <p:cNvSpPr txBox="1"/>
+          <p:nvPr/>
+        </p:nvSpPr>
+        <p:spPr>
+          <a:xfrm>
+            <a:off x="6863079" y="900617"/>
+            <a:ext cx="6004561" cy="3468848"/>
+          </a:xfrm>
+          <a:prstGeom prst="rect">
+            <a:avLst/>
+          </a:prstGeom>
+          <a:ln w="12700">
+            <a:miter lim="400000"/>
+          </a:ln>
+          <a:extLst>
+            <a:ext uri="{C572A759-6A51-4108-AA02-DFA0A04FC94B}">
+              <ma14:wrappingTextBoxFlag xmlns:ma14="http://schemas.microsoft.com/office/mac/drawingml/2011/main" xmlns:a14="http://schemas.microsoft.com/office/drawing/2010/main" xmlns:m="http://schemas.openxmlformats.org/officeDocument/2006/math" xmlns="" val="1"/>
+            </a:ext>
+          </a:extLst>
+        </p:spPr>
+        <p:txBody>
+          <a:bodyPr lIns="45719" rIns="45719">
+            <a:spAutoFit/>
+          </a:bodyPr>
+          <a:lstStyle/>
+          <a:p>
+            <a:pPr>
+              <a:defRPr sz="3200"/>
+            </a:pPr>
+            <a:r>
+              <a:t>function hoist() {</a:t>
+            </a:r>
+          </a:p>
+          <a:p>
+            <a:pPr>
+              <a:defRPr sz="3200"/>
+            </a:pPr>
+            <a:r>
+              <a:t>   var b = undefined;</a:t>
+            </a:r>
+          </a:p>
+          <a:p>
+            <a:pPr>
+              <a:defRPr sz="3200"/>
+            </a:pPr>
+            <a:r>
+              <a:t>  console.log(a,b);</a:t>
+            </a:r>
+          </a:p>
+          <a:p>
+            <a:pPr>
+              <a:defRPr sz="3200"/>
+            </a:pPr>
+            <a:r>
+              <a:t>  window.a = 20;</a:t>
+            </a:r>
+          </a:p>
+          <a:p>
+            <a:pPr>
+              <a:defRPr sz="3200"/>
+            </a:pPr>
+            <a:r>
+              <a:t>  b = 100;</a:t>
+            </a:r>
+          </a:p>
+          <a:p>
+            <a:pPr>
+              <a:defRPr sz="3200"/>
+            </a:pPr>
+            <a:r>
+              <a:t>  console.log(a,b); </a:t>
+            </a:r>
+          </a:p>
+          <a:p>
+            <a:pPr>
+              <a:defRPr sz="3200"/>
+            </a:pPr>
+            <a:r>
+              <a:t>}</a:t>
+            </a:r>
+          </a:p>
+        </p:txBody>
+      </p:sp>
+      <p:sp>
+        <p:nvSpPr>
+          <p:cNvPr id="259" name="Arrow: Right 9"/>
+          <p:cNvSpPr/>
+          <p:nvPr/>
+        </p:nvSpPr>
+        <p:spPr>
+          <a:xfrm>
+            <a:off x="4487560" y="2144832"/>
+            <a:ext cx="2190308" cy="488247"/>
+          </a:xfrm>
+          <a:prstGeom prst="rightArrow">
+            <a:avLst>
+              <a:gd name="adj1" fmla="val 50000"/>
+              <a:gd name="adj2" fmla="val 50000"/>
+            </a:avLst>
+          </a:prstGeom>
+          <a:gradFill>
+            <a:gsLst>
+              <a:gs pos="0">
+                <a:srgbClr val="C00000"/>
+              </a:gs>
+              <a:gs pos="26000">
+                <a:srgbClr val="C00000"/>
+              </a:gs>
+              <a:gs pos="100000">
+                <a:srgbClr val="C00000"/>
+              </a:gs>
+            </a:gsLst>
+            <a:path path="circle">
+              <a:fillToRect l="-19636" t="62278" r="119636" b="37721"/>
+            </a:path>
+          </a:gradFill>
+          <a:ln w="12700">
+            <a:miter lim="400000"/>
+          </a:ln>
+        </p:spPr>
+        <p:txBody>
+          <a:bodyPr lIns="45719" rIns="45719" anchor="ctr"/>
+          <a:lstStyle/>
+          <a:p>
+            <a:pPr algn="ctr">
+              <a:defRPr>
+                <a:solidFill>
+                  <a:srgbClr val="FFFFFF"/>
+                </a:solidFill>
+              </a:defRPr>
+            </a:pPr>
+            <a:endParaRPr/>
+          </a:p>
+        </p:txBody>
+      </p:sp>
+    </p:spTree>
+  </p:cSld>
+  <p:clrMapOvr>
+    <a:masterClrMapping/>
+  </p:clrMapOvr>
+  <p:transition spd="med"/>
+  <p:timing>
+    <p:tnLst>
+      <p:par>
+        <p:cTn id="1" dur="indefinite" restart="never" fill="hold" nodeType="tmRoot">
+          <p:childTnLst>
+            <p:seq concurrent="1" prevAc="none" nextAc="seek">
+              <p:cTn id="2" dur="indefinite" fill="hold" nodeType="mainSeq">
+                <p:childTnLst>
+                  <p:par>
+                    <p:cTn id="3" fill="hold">
+                      <p:stCondLst>
+                        <p:cond delay="indefinite"/>
+                      </p:stCondLst>
+                      <p:childTnLst>
+                        <p:par>
+                          <p:cTn id="4" fill="hold">
+                            <p:stCondLst>
+                              <p:cond delay="0"/>
+                            </p:stCondLst>
+                            <p:childTnLst>
+                              <p:par>
+                                <p:cTn id="5" presetID="1" presetClass="entr" presetSubtype="0" fill="hold" grpId="1" nodeType="clickEffect">
+                                  <p:stCondLst>
+                                    <p:cond delay="0"/>
+                                  </p:stCondLst>
+                                  <p:iterate>
+                                    <p:tmAbs val="0"/>
+                                  </p:iterate>
+                                  <p:childTnLst>
+                                    <p:set>
+                                      <p:cBhvr>
+                                        <p:cTn id="6" fill="hold"/>
+                                        <p:tgtEl>
+                                          <p:spTgt spid="255"/>
+                                        </p:tgtEl>
+                                        <p:attrNameLst>
+                                          <p:attrName>style.visibility</p:attrName>
+                                        </p:attrNameLst>
+                                      </p:cBhvr>
+                                      <p:to>
+                                        <p:strVal val="visible"/>
+                                      </p:to>
+                                    </p:set>
+                                  </p:childTnLst>
+                                </p:cTn>
+                              </p:par>
+                            </p:childTnLst>
+                          </p:cTn>
+                        </p:par>
+                      </p:childTnLst>
+                    </p:cTn>
+                  </p:par>
+                  <p:par>
+                    <p:cTn id="7" fill="hold">
+                      <p:stCondLst>
+                        <p:cond delay="indefinite"/>
+                      </p:stCondLst>
+                      <p:childTnLst>
+                        <p:par>
+                          <p:cTn id="8" fill="hold">
+                            <p:stCondLst>
+                              <p:cond delay="0"/>
+                            </p:stCondLst>
+                            <p:childTnLst>
+                              <p:par>
+                                <p:cTn id="9" presetID="1" presetClass="entr" presetSubtype="0" fill="hold" grpId="2" nodeType="clickEffect">
+                                  <p:stCondLst>
+                                    <p:cond delay="0"/>
+                                  </p:stCondLst>
+                                  <p:iterate>
+                                    <p:tmAbs val="0"/>
+                                  </p:iterate>
+                                  <p:childTnLst>
+                                    <p:set>
+                                      <p:cBhvr>
+                                        <p:cTn id="10" fill="hold"/>
+                                        <p:tgtEl>
+                                          <p:spTgt spid="259"/>
+                                        </p:tgtEl>
+                                        <p:attrNameLst>
+                                          <p:attrName>style.visibility</p:attrName>
+                                        </p:attrNameLst>
+                                      </p:cBhvr>
+                                      <p:to>
+                                        <p:strVal val="visible"/>
+                                      </p:to>
+                                    </p:set>
+                                  </p:childTnLst>
+                                </p:cTn>
+                              </p:par>
+                            </p:childTnLst>
+                          </p:cTn>
+                        </p:par>
+                      </p:childTnLst>
+                    </p:cTn>
+                  </p:par>
+                  <p:par>
+                    <p:cTn id="11" fill="hold">
+                      <p:stCondLst>
+                        <p:cond delay="indefinite"/>
+                      </p:stCondLst>
+                      <p:childTnLst>
+                        <p:par>
+                          <p:cTn id="12" fill="hold">
+                            <p:stCondLst>
+                              <p:cond delay="0"/>
+                            </p:stCondLst>
+                            <p:childTnLst>
+                              <p:par>
+                                <p:cTn id="13" presetID="1" presetClass="entr" presetSubtype="0" fill="hold" grpId="3" nodeType="clickEffect">
+                                  <p:stCondLst>
+                                    <p:cond delay="0"/>
+                                  </p:stCondLst>
+                                  <p:iterate>
+                                    <p:tmAbs val="0"/>
+                                  </p:iterate>
+                                  <p:childTnLst>
+                                    <p:set>
+                                      <p:cBhvr>
+                                        <p:cTn id="14" fill="hold"/>
+                                        <p:tgtEl>
+                                          <p:spTgt spid="258"/>
+                                        </p:tgtEl>
+                                        <p:attrNameLst>
+                                          <p:attrName>style.visibility</p:attrName>
+                                        </p:attrNameLst>
+                                      </p:cBhvr>
+                                      <p:to>
+                                        <p:strVal val="visible"/>
+                                      </p:to>
+                                    </p:set>
+                                  </p:childTnLst>
+                                </p:cTn>
+                              </p:par>
+                            </p:childTnLst>
+                          </p:cTn>
+                        </p:par>
+                      </p:childTnLst>
+                    </p:cTn>
+                  </p:par>
+                  <p:par>
+                    <p:cTn id="15" fill="hold">
+                      <p:stCondLst>
+                        <p:cond delay="indefinite"/>
+                      </p:stCondLst>
+                      <p:childTnLst>
+                        <p:par>
+                          <p:cTn id="16" fill="hold">
+                            <p:stCondLst>
+                              <p:cond delay="0"/>
+                            </p:stCondLst>
+                            <p:childTnLst>
+                              <p:par>
+                                <p:cTn id="17" presetID="1" presetClass="entr" presetSubtype="0" fill="hold" grpId="4" nodeType="clickEffect">
+                                  <p:stCondLst>
+                                    <p:cond delay="0"/>
+                                  </p:stCondLst>
+                                  <p:iterate>
+                                    <p:tmAbs val="0"/>
+                                  </p:iterate>
+                                  <p:childTnLst>
+                                    <p:set>
+                                      <p:cBhvr>
+                                        <p:cTn id="18" fill="hold"/>
+                                        <p:tgtEl>
+                                          <p:spTgt spid="256"/>
+                                        </p:tgtEl>
+                                        <p:attrNameLst>
+                                          <p:attrName>style.visibility</p:attrName>
+                                        </p:attrNameLst>
+                                      </p:cBhvr>
+                                      <p:to>
+                                        <p:strVal val="visible"/>
+                                      </p:to>
+                                    </p:set>
+                                  </p:childTnLst>
+                                </p:cTn>
+                              </p:par>
+                            </p:childTnLst>
+                          </p:cTn>
+                        </p:par>
+                      </p:childTnLst>
+                    </p:cTn>
+                  </p:par>
+                </p:childTnLst>
+              </p:cTn>
+              <p:prevCondLst>
+                <p:cond evt="onPrev" delay="0">
+                  <p:tgtEl>
+                    <p:sldTgt/>
+                  </p:tgtEl>
+                </p:cond>
+              </p:prevCondLst>
+              <p:nextCondLst>
+                <p:cond evt="onNext" delay="0">
+                  <p:tgtEl>
+                    <p:sldTgt/>
+                  </p:tgtEl>
+                </p:cond>
+              </p:nextCondLst>
+            </p:seq>
+          </p:childTnLst>
+        </p:cTn>
+      </p:par>
+    </p:tnLst>
+    <p:bldLst>
+      <p:bldP spid="255" grpId="1" animBg="1" advAuto="0"/>
+      <p:bldP spid="256" grpId="4" animBg="1" advAuto="0"/>
+      <p:bldP spid="258" grpId="3" animBg="1" advAuto="0"/>
+      <p:bldP spid="259" grpId="2" animBg="1" advAuto="0"/>
+    </p:bldLst>
+  </p:timing>
+</p:sld>
+</file>
+
 <file path=ppt/slides/slide38.xml><?xml version="1.0" encoding="utf-8"?>
 <p:sld xmlns:a="http://schemas.openxmlformats.org/drawingml/2006/main" xmlns:r="http://schemas.openxmlformats.org/officeDocument/2006/relationships" xmlns:p="http://schemas.openxmlformats.org/presentationml/2006/main">
   <p:cSld>
@@ -17508,7 +17597,7 @@
           </a:ln>
           <a:extLst>
             <a:ext uri="{C572A759-6A51-4108-AA02-DFA0A04FC94B}">
-              <ma14:wrappingTextBoxFlag xmlns="" xmlns:m="http://schemas.openxmlformats.org/officeDocument/2006/math" xmlns:a14="http://schemas.microsoft.com/office/drawing/2010/main" xmlns:ma14="http://schemas.microsoft.com/office/mac/drawingml/2011/main" val="1"/>
+              <ma14:wrappingTextBoxFlag xmlns:ma14="http://schemas.microsoft.com/office/mac/drawingml/2011/main" xmlns:a14="http://schemas.microsoft.com/office/drawing/2010/main" xmlns:m="http://schemas.openxmlformats.org/officeDocument/2006/math" xmlns="" val="1"/>
             </a:ext>
           </a:extLst>
         </p:spPr>
@@ -17586,7 +17675,7 @@
           </a:ln>
           <a:extLst>
             <a:ext uri="{C572A759-6A51-4108-AA02-DFA0A04FC94B}">
-              <ma14:wrappingTextBoxFlag xmlns="" xmlns:m="http://schemas.openxmlformats.org/officeDocument/2006/math" xmlns:a14="http://schemas.microsoft.com/office/drawing/2010/main" xmlns:ma14="http://schemas.microsoft.com/office/mac/drawingml/2011/main" val="1"/>
+              <ma14:wrappingTextBoxFlag xmlns:ma14="http://schemas.microsoft.com/office/mac/drawingml/2011/main" xmlns:a14="http://schemas.microsoft.com/office/drawing/2010/main" xmlns:m="http://schemas.openxmlformats.org/officeDocument/2006/math" xmlns="" val="1"/>
             </a:ext>
           </a:extLst>
         </p:spPr>
@@ -17659,7 +17748,7 @@
           </a:ln>
           <a:extLst>
             <a:ext uri="{C572A759-6A51-4108-AA02-DFA0A04FC94B}">
-              <ma14:wrappingTextBoxFlag xmlns="" xmlns:m="http://schemas.openxmlformats.org/officeDocument/2006/math" xmlns:a14="http://schemas.microsoft.com/office/drawing/2010/main" xmlns:ma14="http://schemas.microsoft.com/office/mac/drawingml/2011/main" val="1"/>
+              <ma14:wrappingTextBoxFlag xmlns:ma14="http://schemas.microsoft.com/office/mac/drawingml/2011/main" xmlns:a14="http://schemas.microsoft.com/office/drawing/2010/main" xmlns:m="http://schemas.openxmlformats.org/officeDocument/2006/math" xmlns="" val="1"/>
             </a:ext>
           </a:extLst>
         </p:spPr>
@@ -17728,7 +17817,7 @@
           </a:ln>
           <a:extLst>
             <a:ext uri="{C572A759-6A51-4108-AA02-DFA0A04FC94B}">
-              <ma14:wrappingTextBoxFlag xmlns="" xmlns:m="http://schemas.openxmlformats.org/officeDocument/2006/math" xmlns:a14="http://schemas.microsoft.com/office/drawing/2010/main" xmlns:ma14="http://schemas.microsoft.com/office/mac/drawingml/2011/main" val="1"/>
+              <ma14:wrappingTextBoxFlag xmlns:ma14="http://schemas.microsoft.com/office/mac/drawingml/2011/main" xmlns:a14="http://schemas.microsoft.com/office/drawing/2010/main" xmlns:m="http://schemas.openxmlformats.org/officeDocument/2006/math" xmlns="" val="1"/>
             </a:ext>
           </a:extLst>
         </p:spPr>
@@ -17772,7 +17861,7 @@
           </a:ln>
           <a:extLst>
             <a:ext uri="{C572A759-6A51-4108-AA02-DFA0A04FC94B}">
-              <ma14:wrappingTextBoxFlag xmlns="" xmlns:m="http://schemas.openxmlformats.org/officeDocument/2006/math" xmlns:a14="http://schemas.microsoft.com/office/drawing/2010/main" xmlns:ma14="http://schemas.microsoft.com/office/mac/drawingml/2011/main" val="1"/>
+              <ma14:wrappingTextBoxFlag xmlns:ma14="http://schemas.microsoft.com/office/mac/drawingml/2011/main" xmlns:a14="http://schemas.microsoft.com/office/drawing/2010/main" xmlns:m="http://schemas.openxmlformats.org/officeDocument/2006/math" xmlns="" val="1"/>
             </a:ext>
           </a:extLst>
         </p:spPr>
@@ -18148,7 +18237,7 @@
           </a:ln>
           <a:extLst>
             <a:ext uri="{C572A759-6A51-4108-AA02-DFA0A04FC94B}">
-              <ma14:wrappingTextBoxFlag xmlns="" xmlns:m="http://schemas.openxmlformats.org/officeDocument/2006/math" xmlns:a14="http://schemas.microsoft.com/office/drawing/2010/main" xmlns:ma14="http://schemas.microsoft.com/office/mac/drawingml/2011/main" val="1"/>
+              <ma14:wrappingTextBoxFlag xmlns:ma14="http://schemas.microsoft.com/office/mac/drawingml/2011/main" xmlns:a14="http://schemas.microsoft.com/office/drawing/2010/main" xmlns:m="http://schemas.openxmlformats.org/officeDocument/2006/math" xmlns="" val="1"/>
             </a:ext>
           </a:extLst>
         </p:spPr>
@@ -18210,7 +18299,7 @@
           </a:ln>
           <a:extLst>
             <a:ext uri="{C572A759-6A51-4108-AA02-DFA0A04FC94B}">
-              <ma14:wrappingTextBoxFlag xmlns="" xmlns:m="http://schemas.openxmlformats.org/officeDocument/2006/math" xmlns:a14="http://schemas.microsoft.com/office/drawing/2010/main" xmlns:ma14="http://schemas.microsoft.com/office/mac/drawingml/2011/main" val="1"/>
+              <ma14:wrappingTextBoxFlag xmlns:ma14="http://schemas.microsoft.com/office/mac/drawingml/2011/main" xmlns:a14="http://schemas.microsoft.com/office/drawing/2010/main" xmlns:m="http://schemas.openxmlformats.org/officeDocument/2006/math" xmlns="" val="1"/>
             </a:ext>
           </a:extLst>
         </p:spPr>
@@ -18922,7 +19011,7 @@
           </a:ln>
           <a:extLst>
             <a:ext uri="{C572A759-6A51-4108-AA02-DFA0A04FC94B}">
-              <ma14:wrappingTextBoxFlag xmlns="" xmlns:m="http://schemas.openxmlformats.org/officeDocument/2006/math" xmlns:a14="http://schemas.microsoft.com/office/drawing/2010/main" xmlns:ma14="http://schemas.microsoft.com/office/mac/drawingml/2011/main" val="1"/>
+              <ma14:wrappingTextBoxFlag xmlns:ma14="http://schemas.microsoft.com/office/mac/drawingml/2011/main" xmlns:a14="http://schemas.microsoft.com/office/drawing/2010/main" xmlns:m="http://schemas.openxmlformats.org/officeDocument/2006/math" xmlns="" val="1"/>
             </a:ext>
           </a:extLst>
         </p:spPr>
@@ -18988,7 +19077,7 @@
           </a:ln>
           <a:extLst>
             <a:ext uri="{C572A759-6A51-4108-AA02-DFA0A04FC94B}">
-              <ma14:wrappingTextBoxFlag xmlns="" xmlns:m="http://schemas.openxmlformats.org/officeDocument/2006/math" xmlns:a14="http://schemas.microsoft.com/office/drawing/2010/main" xmlns:ma14="http://schemas.microsoft.com/office/mac/drawingml/2011/main" val="1"/>
+              <ma14:wrappingTextBoxFlag xmlns:ma14="http://schemas.microsoft.com/office/mac/drawingml/2011/main" xmlns:a14="http://schemas.microsoft.com/office/drawing/2010/main" xmlns:m="http://schemas.openxmlformats.org/officeDocument/2006/math" xmlns="" val="1"/>
             </a:ext>
           </a:extLst>
         </p:spPr>
@@ -19407,7 +19496,7 @@
             <a:effectLst/>
             <a:extLst>
               <a:ext uri="{C572A759-6A51-4108-AA02-DFA0A04FC94B}">
-                <ma14:wrappingTextBoxFlag xmlns="" xmlns:m="http://schemas.openxmlformats.org/officeDocument/2006/math" xmlns:a14="http://schemas.microsoft.com/office/drawing/2010/main" xmlns:ma14="http://schemas.microsoft.com/office/mac/drawingml/2011/main" val="1"/>
+                <ma14:wrappingTextBoxFlag xmlns:ma14="http://schemas.microsoft.com/office/mac/drawingml/2011/main" xmlns:a14="http://schemas.microsoft.com/office/drawing/2010/main" xmlns:m="http://schemas.openxmlformats.org/officeDocument/2006/math" xmlns="" val="1"/>
               </a:ext>
             </a:extLst>
           </p:spPr>
@@ -19422,6 +19511,7 @@
             </a:lstStyle>
             <a:p>
               <a:r>
+                <a:rPr dirty="0"/>
                 <a:t>Object Comparison</a:t>
               </a:r>
             </a:p>
@@ -19486,7 +19576,7 @@
           </a:ln>
           <a:extLst>
             <a:ext uri="{C572A759-6A51-4108-AA02-DFA0A04FC94B}">
-              <ma14:wrappingTextBoxFlag xmlns="" xmlns:m="http://schemas.openxmlformats.org/officeDocument/2006/math" xmlns:a14="http://schemas.microsoft.com/office/drawing/2010/main" xmlns:ma14="http://schemas.microsoft.com/office/mac/drawingml/2011/main" val="1"/>
+              <ma14:wrappingTextBoxFlag xmlns:ma14="http://schemas.microsoft.com/office/mac/drawingml/2011/main" xmlns:a14="http://schemas.microsoft.com/office/drawing/2010/main" xmlns:m="http://schemas.openxmlformats.org/officeDocument/2006/math" xmlns="" val="1"/>
             </a:ext>
           </a:extLst>
         </p:spPr>
@@ -19559,7 +19649,7 @@
           </a:ln>
           <a:extLst>
             <a:ext uri="{C572A759-6A51-4108-AA02-DFA0A04FC94B}">
-              <ma14:wrappingTextBoxFlag xmlns="" xmlns:m="http://schemas.openxmlformats.org/officeDocument/2006/math" xmlns:a14="http://schemas.microsoft.com/office/drawing/2010/main" xmlns:ma14="http://schemas.microsoft.com/office/mac/drawingml/2011/main" val="1"/>
+              <ma14:wrappingTextBoxFlag xmlns:ma14="http://schemas.microsoft.com/office/mac/drawingml/2011/main" xmlns:a14="http://schemas.microsoft.com/office/drawing/2010/main" xmlns:m="http://schemas.openxmlformats.org/officeDocument/2006/math" xmlns="" val="1"/>
             </a:ext>
           </a:extLst>
         </p:spPr>
@@ -20488,7 +20578,7 @@
             <a:effectLst/>
             <a:extLst>
               <a:ext uri="{C572A759-6A51-4108-AA02-DFA0A04FC94B}">
-                <ma14:wrappingTextBoxFlag xmlns="" xmlns:m="http://schemas.openxmlformats.org/officeDocument/2006/math" xmlns:a14="http://schemas.microsoft.com/office/drawing/2010/main" xmlns:ma14="http://schemas.microsoft.com/office/mac/drawingml/2011/main" val="1"/>
+                <ma14:wrappingTextBoxFlag xmlns:ma14="http://schemas.microsoft.com/office/mac/drawingml/2011/main" xmlns:a14="http://schemas.microsoft.com/office/drawing/2010/main" xmlns:m="http://schemas.openxmlformats.org/officeDocument/2006/math" xmlns="" val="1"/>
               </a:ext>
             </a:extLst>
           </p:spPr>
@@ -20567,7 +20657,7 @@
           </a:ln>
           <a:extLst>
             <a:ext uri="{C572A759-6A51-4108-AA02-DFA0A04FC94B}">
-              <ma14:wrappingTextBoxFlag xmlns="" xmlns:m="http://schemas.openxmlformats.org/officeDocument/2006/math" xmlns:a14="http://schemas.microsoft.com/office/drawing/2010/main" xmlns:ma14="http://schemas.microsoft.com/office/mac/drawingml/2011/main" val="1"/>
+              <ma14:wrappingTextBoxFlag xmlns:ma14="http://schemas.microsoft.com/office/mac/drawingml/2011/main" xmlns:a14="http://schemas.microsoft.com/office/drawing/2010/main" xmlns:m="http://schemas.openxmlformats.org/officeDocument/2006/math" xmlns="" val="1"/>
             </a:ext>
           </a:extLst>
         </p:spPr>
@@ -20640,7 +20730,7 @@
           </a:ln>
           <a:extLst>
             <a:ext uri="{C572A759-6A51-4108-AA02-DFA0A04FC94B}">
-              <ma14:wrappingTextBoxFlag xmlns="" xmlns:m="http://schemas.openxmlformats.org/officeDocument/2006/math" xmlns:a14="http://schemas.microsoft.com/office/drawing/2010/main" xmlns:ma14="http://schemas.microsoft.com/office/mac/drawingml/2011/main" val="1"/>
+              <ma14:wrappingTextBoxFlag xmlns:ma14="http://schemas.microsoft.com/office/mac/drawingml/2011/main" xmlns:a14="http://schemas.microsoft.com/office/drawing/2010/main" xmlns:m="http://schemas.openxmlformats.org/officeDocument/2006/math" xmlns="" val="1"/>
             </a:ext>
           </a:extLst>
         </p:spPr>
@@ -20727,7 +20817,7 @@
         <p:spPr>
           <a:xfrm>
             <a:off x="716280" y="1902380"/>
-            <a:ext cx="3615690" cy="4330959"/>
+            <a:ext cx="3615690" cy="4832092"/>
           </a:xfrm>
           <a:prstGeom prst="rect">
             <a:avLst/>
@@ -20737,7 +20827,7 @@
           </a:ln>
           <a:extLst>
             <a:ext uri="{C572A759-6A51-4108-AA02-DFA0A04FC94B}">
-              <ma14:wrappingTextBoxFlag xmlns="" xmlns:m="http://schemas.openxmlformats.org/officeDocument/2006/math" xmlns:a14="http://schemas.microsoft.com/office/drawing/2010/main" xmlns:ma14="http://schemas.microsoft.com/office/mac/drawingml/2011/main" val="1"/>
+              <ma14:wrappingTextBoxFlag xmlns:ma14="http://schemas.microsoft.com/office/mac/drawingml/2011/main" xmlns:a14="http://schemas.microsoft.com/office/drawing/2010/main" xmlns:m="http://schemas.openxmlformats.org/officeDocument/2006/math" xmlns="" val="1"/>
             </a:ext>
           </a:extLst>
         </p:spPr>
@@ -20751,7 +20841,24 @@
               <a:defRPr sz="2800"/>
             </a:pPr>
             <a:r>
-              <a:t>function myfun(a,b) {</a:t>
+              <a:rPr dirty="0"/>
+              <a:t>function </a:t>
+            </a:r>
+            <a:r>
+              <a:rPr dirty="0" err="1"/>
+              <a:t>myfun</a:t>
+            </a:r>
+            <a:r>
+              <a:rPr dirty="0"/>
+              <a:t>(a</a:t>
+            </a:r>
+            <a:r>
+              <a:rPr lang="en-US" dirty="0"/>
+              <a:t>=20</a:t>
+            </a:r>
+            <a:r>
+              <a:rPr dirty="0"/>
+              <a:t>,b) {</a:t>
             </a:r>
           </a:p>
           <a:p>
@@ -20759,7 +20866,16 @@
               <a:defRPr sz="2800"/>
             </a:pPr>
             <a:r>
-              <a:t>  console.log("hi");</a:t>
+              <a:rPr dirty="0"/>
+              <a:t>  </a:t>
+            </a:r>
+            <a:r>
+              <a:rPr dirty="0" err="1"/>
+              <a:t>console.log</a:t>
+            </a:r>
+            <a:r>
+              <a:rPr dirty="0"/>
+              <a:t>("hi");</a:t>
             </a:r>
           </a:p>
           <a:p>
@@ -20767,6 +20883,7 @@
               <a:defRPr sz="2800"/>
             </a:pPr>
             <a:r>
+              <a:rPr dirty="0"/>
               <a:t>  if(a==10)</a:t>
             </a:r>
           </a:p>
@@ -20775,6 +20892,7 @@
               <a:defRPr sz="2800"/>
             </a:pPr>
             <a:r>
+              <a:rPr dirty="0"/>
               <a:t>  {</a:t>
             </a:r>
           </a:p>
@@ -20783,14 +20901,21 @@
               <a:defRPr sz="2800"/>
             </a:pPr>
             <a:r>
+              <a:rPr dirty="0"/>
               <a:t>    return a-b;</a:t>
             </a:r>
+            <a:r>
+              <a:rPr lang="en-US" dirty="0"/>
+              <a:t> // -10</a:t>
+            </a:r>
+            <a:endParaRPr dirty="0"/>
           </a:p>
           <a:p>
             <a:pPr>
               <a:defRPr sz="2800"/>
             </a:pPr>
             <a:r>
+              <a:rPr dirty="0"/>
               <a:t>  }</a:t>
             </a:r>
           </a:p>
@@ -20799,7 +20924,16 @@
               <a:defRPr sz="2800"/>
             </a:pPr>
             <a:r>
-              <a:t>  console.log( a + b ); </a:t>
+              <a:rPr dirty="0"/>
+              <a:t>  </a:t>
+            </a:r>
+            <a:r>
+              <a:rPr dirty="0" err="1"/>
+              <a:t>console.log</a:t>
+            </a:r>
+            <a:r>
+              <a:rPr dirty="0"/>
+              <a:t>( a + b ); </a:t>
             </a:r>
           </a:p>
           <a:p>
@@ -20807,7 +20941,16 @@
               <a:defRPr sz="2800"/>
             </a:pPr>
             <a:r>
-              <a:t>  return a+b;</a:t>
+              <a:rPr dirty="0"/>
+              <a:t>  return </a:t>
+            </a:r>
+            <a:r>
+              <a:rPr dirty="0" err="1"/>
+              <a:t>a+b</a:t>
+            </a:r>
+            <a:r>
+              <a:rPr dirty="0"/>
+              <a:t>;</a:t>
             </a:r>
           </a:p>
           <a:p>
@@ -20815,7 +20958,16 @@
               <a:defRPr sz="2800"/>
             </a:pPr>
             <a:r>
-              <a:t>  console.log("hello");</a:t>
+              <a:rPr dirty="0"/>
+              <a:t>  </a:t>
+            </a:r>
+            <a:r>
+              <a:rPr dirty="0" err="1"/>
+              <a:t>console.log</a:t>
+            </a:r>
+            <a:r>
+              <a:rPr dirty="0"/>
+              <a:t>("hello");</a:t>
             </a:r>
           </a:p>
           <a:p>
@@ -20823,6 +20975,7 @@
               <a:defRPr sz="2800"/>
             </a:pPr>
             <a:r>
+              <a:rPr dirty="0"/>
               <a:t>}</a:t>
             </a:r>
           </a:p>
@@ -20847,7 +21000,7 @@
           </a:ln>
           <a:extLst>
             <a:ext uri="{C572A759-6A51-4108-AA02-DFA0A04FC94B}">
-              <ma14:wrappingTextBoxFlag xmlns="" xmlns:m="http://schemas.openxmlformats.org/officeDocument/2006/math" xmlns:a14="http://schemas.microsoft.com/office/drawing/2010/main" xmlns:ma14="http://schemas.microsoft.com/office/mac/drawingml/2011/main" val="1"/>
+              <ma14:wrappingTextBoxFlag xmlns:ma14="http://schemas.microsoft.com/office/mac/drawingml/2011/main" xmlns:a14="http://schemas.microsoft.com/office/drawing/2010/main" xmlns:m="http://schemas.openxmlformats.org/officeDocument/2006/math" xmlns="" val="1"/>
             </a:ext>
           </a:extLst>
         </p:spPr>
@@ -20913,7 +21066,7 @@
           </a:ln>
           <a:extLst>
             <a:ext uri="{C572A759-6A51-4108-AA02-DFA0A04FC94B}">
-              <ma14:wrappingTextBoxFlag xmlns="" xmlns:m="http://schemas.openxmlformats.org/officeDocument/2006/math" xmlns:a14="http://schemas.microsoft.com/office/drawing/2010/main" xmlns:ma14="http://schemas.microsoft.com/office/mac/drawingml/2011/main" val="1"/>
+              <ma14:wrappingTextBoxFlag xmlns:ma14="http://schemas.microsoft.com/office/mac/drawingml/2011/main" xmlns:a14="http://schemas.microsoft.com/office/drawing/2010/main" xmlns:m="http://schemas.openxmlformats.org/officeDocument/2006/math" xmlns="" val="1"/>
             </a:ext>
           </a:extLst>
         </p:spPr>
@@ -20926,14 +21079,23 @@
             <a:pPr>
               <a:defRPr sz="3200"/>
             </a:pPr>
-            <a:endParaRPr/>
+            <a:endParaRPr dirty="0"/>
           </a:p>
           <a:p>
             <a:pPr>
               <a:defRPr sz="3200"/>
             </a:pPr>
             <a:r>
-              <a:t> a1 = myfun(10,20);</a:t>
+              <a:rPr dirty="0"/>
+              <a:t> a1 = </a:t>
+            </a:r>
+            <a:r>
+              <a:rPr dirty="0" err="1"/>
+              <a:t>myfun</a:t>
+            </a:r>
+            <a:r>
+              <a:rPr dirty="0"/>
+              <a:t>(10,20);</a:t>
             </a:r>
           </a:p>
           <a:p>
@@ -20941,21 +21103,39 @@
               <a:defRPr sz="3200"/>
             </a:pPr>
             <a:r>
-              <a:t> console.log( a1 ); </a:t>
+              <a:rPr dirty="0"/>
+              <a:t> </a:t>
+            </a:r>
+            <a:r>
+              <a:rPr dirty="0" err="1"/>
+              <a:t>console.log</a:t>
+            </a:r>
+            <a:r>
+              <a:rPr dirty="0"/>
+              <a:t>( a1 ); </a:t>
             </a:r>
           </a:p>
           <a:p>
             <a:pPr>
               <a:defRPr sz="3200"/>
             </a:pPr>
-            <a:endParaRPr/>
+            <a:endParaRPr dirty="0"/>
           </a:p>
           <a:p>
             <a:pPr>
               <a:defRPr sz="3200"/>
             </a:pPr>
             <a:r>
-              <a:t> b1 = myfun(20,10);</a:t>
+              <a:rPr dirty="0"/>
+              <a:t> b1 = </a:t>
+            </a:r>
+            <a:r>
+              <a:rPr dirty="0" err="1"/>
+              <a:t>myfun</a:t>
+            </a:r>
+            <a:r>
+              <a:rPr dirty="0"/>
+              <a:t>(20,10);</a:t>
             </a:r>
           </a:p>
           <a:p>
@@ -20963,7 +21143,16 @@
               <a:defRPr sz="3200"/>
             </a:pPr>
             <a:r>
-              <a:t> console.log( b1 ); </a:t>
+              <a:rPr dirty="0"/>
+              <a:t> </a:t>
+            </a:r>
+            <a:r>
+              <a:rPr dirty="0" err="1"/>
+              <a:t>console.log</a:t>
+            </a:r>
+            <a:r>
+              <a:rPr dirty="0"/>
+              <a:t>( b1 ); </a:t>
             </a:r>
           </a:p>
         </p:txBody>
@@ -21468,7 +21657,7 @@
         <p:spPr>
           <a:xfrm>
             <a:off x="7329389" y="2311350"/>
-            <a:ext cx="3679147" cy="2225736"/>
+            <a:ext cx="3679147" cy="2308324"/>
           </a:xfrm>
           <a:prstGeom prst="rect">
             <a:avLst/>
@@ -21478,7 +21667,7 @@
           </a:ln>
           <a:extLst>
             <a:ext uri="{C572A759-6A51-4108-AA02-DFA0A04FC94B}">
-              <ma14:wrappingTextBoxFlag xmlns="" xmlns:m="http://schemas.openxmlformats.org/officeDocument/2006/math" xmlns:a14="http://schemas.microsoft.com/office/drawing/2010/main" xmlns:ma14="http://schemas.microsoft.com/office/mac/drawingml/2011/main" val="1"/>
+              <ma14:wrappingTextBoxFlag xmlns:ma14="http://schemas.microsoft.com/office/mac/drawingml/2011/main" xmlns:a14="http://schemas.microsoft.com/office/drawing/2010/main" xmlns:m="http://schemas.openxmlformats.org/officeDocument/2006/math" xmlns="" val="1"/>
             </a:ext>
           </a:extLst>
         </p:spPr>
@@ -21492,6 +21681,7 @@
               <a:defRPr sz="3600"/>
             </a:pPr>
             <a:r>
+              <a:rPr dirty="0"/>
               <a:t> m1 = f1(10);</a:t>
             </a:r>
           </a:p>
@@ -21500,7 +21690,12 @@
               <a:defRPr sz="3600"/>
             </a:pPr>
             <a:r>
-              <a:t>Console.log(m1);</a:t>
+              <a:rPr dirty="0" err="1"/>
+              <a:t>Console.log</a:t>
+            </a:r>
+            <a:r>
+              <a:rPr dirty="0"/>
+              <a:t>(m1);</a:t>
             </a:r>
           </a:p>
           <a:p>
@@ -21508,7 +21703,14 @@
               <a:defRPr sz="3600"/>
             </a:pPr>
             <a:r>
-              <a:t>m1 = f1(10);</a:t>
+              <a:t>m1 = f1(1</a:t>
+            </a:r>
+            <a:r>
+              <a:rPr lang="en-US"/>
+              <a:t>1</a:t>
+            </a:r>
+            <a:r>
+              <a:t>);</a:t>
             </a:r>
           </a:p>
           <a:p>
@@ -21516,7 +21718,12 @@
               <a:defRPr sz="3600"/>
             </a:pPr>
             <a:r>
-              <a:t>Console.log(m1);</a:t>
+              <a:rPr dirty="0" err="1"/>
+              <a:t>Console.log</a:t>
+            </a:r>
+            <a:r>
+              <a:rPr dirty="0"/>
+              <a:t>(m1);</a:t>
             </a:r>
           </a:p>
         </p:txBody>
@@ -21623,7 +21830,7 @@
           </a:ln>
           <a:extLst>
             <a:ext uri="{C572A759-6A51-4108-AA02-DFA0A04FC94B}">
-              <ma14:wrappingTextBoxFlag xmlns="" xmlns:m="http://schemas.openxmlformats.org/officeDocument/2006/math" xmlns:a14="http://schemas.microsoft.com/office/drawing/2010/main" xmlns:ma14="http://schemas.microsoft.com/office/mac/drawingml/2011/main" val="1"/>
+              <ma14:wrappingTextBoxFlag xmlns:ma14="http://schemas.microsoft.com/office/mac/drawingml/2011/main" xmlns:a14="http://schemas.microsoft.com/office/drawing/2010/main" xmlns:m="http://schemas.openxmlformats.org/officeDocument/2006/math" xmlns="" val="1"/>
             </a:ext>
           </a:extLst>
         </p:spPr>
@@ -21672,7 +21879,7 @@
           </a:ln>
           <a:extLst>
             <a:ext uri="{C572A759-6A51-4108-AA02-DFA0A04FC94B}">
-              <ma14:wrappingTextBoxFlag xmlns="" xmlns:m="http://schemas.openxmlformats.org/officeDocument/2006/math" xmlns:a14="http://schemas.microsoft.com/office/drawing/2010/main" xmlns:ma14="http://schemas.microsoft.com/office/mac/drawingml/2011/main" val="1"/>
+              <ma14:wrappingTextBoxFlag xmlns:ma14="http://schemas.microsoft.com/office/mac/drawingml/2011/main" xmlns:a14="http://schemas.microsoft.com/office/drawing/2010/main" xmlns:m="http://schemas.openxmlformats.org/officeDocument/2006/math" xmlns="" val="1"/>
             </a:ext>
           </a:extLst>
         </p:spPr>
@@ -21966,7 +22173,7 @@
           </a:ln>
           <a:extLst>
             <a:ext uri="{C572A759-6A51-4108-AA02-DFA0A04FC94B}">
-              <ma14:wrappingTextBoxFlag xmlns="" xmlns:m="http://schemas.openxmlformats.org/officeDocument/2006/math" xmlns:a14="http://schemas.microsoft.com/office/drawing/2010/main" xmlns:ma14="http://schemas.microsoft.com/office/mac/drawingml/2011/main" val="1"/>
+              <ma14:wrappingTextBoxFlag xmlns:ma14="http://schemas.microsoft.com/office/mac/drawingml/2011/main" xmlns:a14="http://schemas.microsoft.com/office/drawing/2010/main" xmlns:m="http://schemas.openxmlformats.org/officeDocument/2006/math" xmlns="" val="1"/>
             </a:ext>
           </a:extLst>
         </p:spPr>
@@ -22426,7 +22633,7 @@
             <a:effectLst/>
             <a:extLst>
               <a:ext uri="{C572A759-6A51-4108-AA02-DFA0A04FC94B}">
-                <ma14:wrappingTextBoxFlag xmlns="" xmlns:m="http://schemas.openxmlformats.org/officeDocument/2006/math" xmlns:a14="http://schemas.microsoft.com/office/drawing/2010/main" xmlns:ma14="http://schemas.microsoft.com/office/mac/drawingml/2011/main" val="1"/>
+                <ma14:wrappingTextBoxFlag xmlns:ma14="http://schemas.microsoft.com/office/mac/drawingml/2011/main" xmlns:a14="http://schemas.microsoft.com/office/drawing/2010/main" xmlns:m="http://schemas.openxmlformats.org/officeDocument/2006/math" xmlns="" val="1"/>
               </a:ext>
             </a:extLst>
           </p:spPr>
@@ -22538,7 +22745,7 @@
             <a:effectLst/>
             <a:extLst>
               <a:ext uri="{C572A759-6A51-4108-AA02-DFA0A04FC94B}">
-                <ma14:wrappingTextBoxFlag xmlns="" xmlns:m="http://schemas.openxmlformats.org/officeDocument/2006/math" xmlns:a14="http://schemas.microsoft.com/office/drawing/2010/main" xmlns:ma14="http://schemas.microsoft.com/office/mac/drawingml/2011/main" val="1"/>
+                <ma14:wrappingTextBoxFlag xmlns:ma14="http://schemas.microsoft.com/office/mac/drawingml/2011/main" xmlns:a14="http://schemas.microsoft.com/office/drawing/2010/main" xmlns:m="http://schemas.openxmlformats.org/officeDocument/2006/math" xmlns="" val="1"/>
               </a:ext>
             </a:extLst>
           </p:spPr>
@@ -22650,7 +22857,7 @@
             <a:effectLst/>
             <a:extLst>
               <a:ext uri="{C572A759-6A51-4108-AA02-DFA0A04FC94B}">
-                <ma14:wrappingTextBoxFlag xmlns="" xmlns:m="http://schemas.openxmlformats.org/officeDocument/2006/math" xmlns:a14="http://schemas.microsoft.com/office/drawing/2010/main" xmlns:ma14="http://schemas.microsoft.com/office/mac/drawingml/2011/main" val="1"/>
+                <ma14:wrappingTextBoxFlag xmlns:ma14="http://schemas.microsoft.com/office/mac/drawingml/2011/main" xmlns:a14="http://schemas.microsoft.com/office/drawing/2010/main" xmlns:m="http://schemas.openxmlformats.org/officeDocument/2006/math" xmlns="" val="1"/>
               </a:ext>
             </a:extLst>
           </p:spPr>
@@ -22762,7 +22969,7 @@
             <a:effectLst/>
             <a:extLst>
               <a:ext uri="{C572A759-6A51-4108-AA02-DFA0A04FC94B}">
-                <ma14:wrappingTextBoxFlag xmlns="" xmlns:m="http://schemas.openxmlformats.org/officeDocument/2006/math" xmlns:a14="http://schemas.microsoft.com/office/drawing/2010/main" xmlns:ma14="http://schemas.microsoft.com/office/mac/drawingml/2011/main" val="1"/>
+                <ma14:wrappingTextBoxFlag xmlns:ma14="http://schemas.microsoft.com/office/mac/drawingml/2011/main" xmlns:a14="http://schemas.microsoft.com/office/drawing/2010/main" xmlns:m="http://schemas.openxmlformats.org/officeDocument/2006/math" xmlns="" val="1"/>
               </a:ext>
             </a:extLst>
           </p:spPr>
@@ -22857,7 +23064,7 @@
             <a:effectLst/>
             <a:extLst>
               <a:ext uri="{C572A759-6A51-4108-AA02-DFA0A04FC94B}">
-                <ma14:wrappingTextBoxFlag xmlns="" xmlns:m="http://schemas.openxmlformats.org/officeDocument/2006/math" xmlns:a14="http://schemas.microsoft.com/office/drawing/2010/main" xmlns:ma14="http://schemas.microsoft.com/office/mac/drawingml/2011/main" val="1"/>
+                <ma14:wrappingTextBoxFlag xmlns:ma14="http://schemas.microsoft.com/office/mac/drawingml/2011/main" xmlns:a14="http://schemas.microsoft.com/office/drawing/2010/main" xmlns:m="http://schemas.openxmlformats.org/officeDocument/2006/math" xmlns="" val="1"/>
               </a:ext>
             </a:extLst>
           </p:spPr>
@@ -22898,7 +23105,7 @@
           </a:ln>
           <a:extLst>
             <a:ext uri="{C572A759-6A51-4108-AA02-DFA0A04FC94B}">
-              <ma14:wrappingTextBoxFlag xmlns="" xmlns:m="http://schemas.openxmlformats.org/officeDocument/2006/math" xmlns:a14="http://schemas.microsoft.com/office/drawing/2010/main" xmlns:ma14="http://schemas.microsoft.com/office/mac/drawingml/2011/main" val="1"/>
+              <ma14:wrappingTextBoxFlag xmlns:ma14="http://schemas.microsoft.com/office/mac/drawingml/2011/main" xmlns:a14="http://schemas.microsoft.com/office/drawing/2010/main" xmlns:m="http://schemas.openxmlformats.org/officeDocument/2006/math" xmlns="" val="1"/>
             </a:ext>
           </a:extLst>
         </p:spPr>
@@ -22936,7 +23143,7 @@
           </a:ln>
           <a:extLst>
             <a:ext uri="{C572A759-6A51-4108-AA02-DFA0A04FC94B}">
-              <ma14:wrappingTextBoxFlag xmlns="" xmlns:m="http://schemas.openxmlformats.org/officeDocument/2006/math" xmlns:a14="http://schemas.microsoft.com/office/drawing/2010/main" xmlns:ma14="http://schemas.microsoft.com/office/mac/drawingml/2011/main" val="1"/>
+              <ma14:wrappingTextBoxFlag xmlns:ma14="http://schemas.microsoft.com/office/mac/drawingml/2011/main" xmlns:a14="http://schemas.microsoft.com/office/drawing/2010/main" xmlns:m="http://schemas.openxmlformats.org/officeDocument/2006/math" xmlns="" val="1"/>
             </a:ext>
           </a:extLst>
         </p:spPr>
@@ -22974,7 +23181,7 @@
           </a:ln>
           <a:extLst>
             <a:ext uri="{C572A759-6A51-4108-AA02-DFA0A04FC94B}">
-              <ma14:wrappingTextBoxFlag xmlns="" xmlns:m="http://schemas.openxmlformats.org/officeDocument/2006/math" xmlns:a14="http://schemas.microsoft.com/office/drawing/2010/main" xmlns:ma14="http://schemas.microsoft.com/office/mac/drawingml/2011/main" val="1"/>
+              <ma14:wrappingTextBoxFlag xmlns:ma14="http://schemas.microsoft.com/office/mac/drawingml/2011/main" xmlns:a14="http://schemas.microsoft.com/office/drawing/2010/main" xmlns:m="http://schemas.openxmlformats.org/officeDocument/2006/math" xmlns="" val="1"/>
             </a:ext>
           </a:extLst>
         </p:spPr>
@@ -23012,7 +23219,7 @@
           </a:ln>
           <a:extLst>
             <a:ext uri="{C572A759-6A51-4108-AA02-DFA0A04FC94B}">
-              <ma14:wrappingTextBoxFlag xmlns="" xmlns:m="http://schemas.openxmlformats.org/officeDocument/2006/math" xmlns:a14="http://schemas.microsoft.com/office/drawing/2010/main" xmlns:ma14="http://schemas.microsoft.com/office/mac/drawingml/2011/main" val="1"/>
+              <ma14:wrappingTextBoxFlag xmlns:ma14="http://schemas.microsoft.com/office/mac/drawingml/2011/main" xmlns:a14="http://schemas.microsoft.com/office/drawing/2010/main" xmlns:m="http://schemas.openxmlformats.org/officeDocument/2006/math" xmlns="" val="1"/>
             </a:ext>
           </a:extLst>
         </p:spPr>
@@ -23050,7 +23257,7 @@
           </a:ln>
           <a:extLst>
             <a:ext uri="{C572A759-6A51-4108-AA02-DFA0A04FC94B}">
-              <ma14:wrappingTextBoxFlag xmlns="" xmlns:m="http://schemas.openxmlformats.org/officeDocument/2006/math" xmlns:a14="http://schemas.microsoft.com/office/drawing/2010/main" xmlns:ma14="http://schemas.microsoft.com/office/mac/drawingml/2011/main" val="1"/>
+              <ma14:wrappingTextBoxFlag xmlns:ma14="http://schemas.microsoft.com/office/mac/drawingml/2011/main" xmlns:a14="http://schemas.microsoft.com/office/drawing/2010/main" xmlns:m="http://schemas.openxmlformats.org/officeDocument/2006/math" xmlns="" val="1"/>
             </a:ext>
           </a:extLst>
         </p:spPr>
@@ -23088,7 +23295,7 @@
           </a:ln>
           <a:extLst>
             <a:ext uri="{C572A759-6A51-4108-AA02-DFA0A04FC94B}">
-              <ma14:wrappingTextBoxFlag xmlns="" xmlns:m="http://schemas.openxmlformats.org/officeDocument/2006/math" xmlns:a14="http://schemas.microsoft.com/office/drawing/2010/main" xmlns:ma14="http://schemas.microsoft.com/office/mac/drawingml/2011/main" val="1"/>
+              <ma14:wrappingTextBoxFlag xmlns:ma14="http://schemas.microsoft.com/office/mac/drawingml/2011/main" xmlns:a14="http://schemas.microsoft.com/office/drawing/2010/main" xmlns:m="http://schemas.openxmlformats.org/officeDocument/2006/math" xmlns="" val="1"/>
             </a:ext>
           </a:extLst>
         </p:spPr>
@@ -23126,7 +23333,7 @@
           </a:ln>
           <a:extLst>
             <a:ext uri="{C572A759-6A51-4108-AA02-DFA0A04FC94B}">
-              <ma14:wrappingTextBoxFlag xmlns="" xmlns:m="http://schemas.openxmlformats.org/officeDocument/2006/math" xmlns:a14="http://schemas.microsoft.com/office/drawing/2010/main" xmlns:ma14="http://schemas.microsoft.com/office/mac/drawingml/2011/main" val="1"/>
+              <ma14:wrappingTextBoxFlag xmlns:ma14="http://schemas.microsoft.com/office/mac/drawingml/2011/main" xmlns:a14="http://schemas.microsoft.com/office/drawing/2010/main" xmlns:m="http://schemas.openxmlformats.org/officeDocument/2006/math" xmlns="" val="1"/>
             </a:ext>
           </a:extLst>
         </p:spPr>
@@ -23164,7 +23371,7 @@
           </a:ln>
           <a:extLst>
             <a:ext uri="{C572A759-6A51-4108-AA02-DFA0A04FC94B}">
-              <ma14:wrappingTextBoxFlag xmlns="" xmlns:m="http://schemas.openxmlformats.org/officeDocument/2006/math" xmlns:a14="http://schemas.microsoft.com/office/drawing/2010/main" xmlns:ma14="http://schemas.microsoft.com/office/mac/drawingml/2011/main" val="1"/>
+              <ma14:wrappingTextBoxFlag xmlns:ma14="http://schemas.microsoft.com/office/mac/drawingml/2011/main" xmlns:a14="http://schemas.microsoft.com/office/drawing/2010/main" xmlns:m="http://schemas.openxmlformats.org/officeDocument/2006/math" xmlns="" val="1"/>
             </a:ext>
           </a:extLst>
         </p:spPr>
@@ -23199,7 +23406,7 @@
           </a:ln>
           <a:extLst>
             <a:ext uri="{C572A759-6A51-4108-AA02-DFA0A04FC94B}">
-              <ma14:wrappingTextBoxFlag xmlns="" xmlns:m="http://schemas.openxmlformats.org/officeDocument/2006/math" xmlns:a14="http://schemas.microsoft.com/office/drawing/2010/main" xmlns:ma14="http://schemas.microsoft.com/office/mac/drawingml/2011/main" val="1"/>
+              <ma14:wrappingTextBoxFlag xmlns:ma14="http://schemas.microsoft.com/office/mac/drawingml/2011/main" xmlns:a14="http://schemas.microsoft.com/office/drawing/2010/main" xmlns:m="http://schemas.openxmlformats.org/officeDocument/2006/math" xmlns="" val="1"/>
             </a:ext>
           </a:extLst>
         </p:spPr>
@@ -23247,7 +23454,7 @@
           </a:ln>
           <a:extLst>
             <a:ext uri="{C572A759-6A51-4108-AA02-DFA0A04FC94B}">
-              <ma14:wrappingTextBoxFlag xmlns="" xmlns:m="http://schemas.openxmlformats.org/officeDocument/2006/math" xmlns:a14="http://schemas.microsoft.com/office/drawing/2010/main" xmlns:ma14="http://schemas.microsoft.com/office/mac/drawingml/2011/main" val="1"/>
+              <ma14:wrappingTextBoxFlag xmlns:ma14="http://schemas.microsoft.com/office/mac/drawingml/2011/main" xmlns:a14="http://schemas.microsoft.com/office/drawing/2010/main" xmlns:m="http://schemas.openxmlformats.org/officeDocument/2006/math" xmlns="" val="1"/>
             </a:ext>
           </a:extLst>
         </p:spPr>
@@ -23292,7 +23499,7 @@
           </a:ln>
           <a:extLst>
             <a:ext uri="{C572A759-6A51-4108-AA02-DFA0A04FC94B}">
-              <ma14:wrappingTextBoxFlag xmlns="" xmlns:m="http://schemas.openxmlformats.org/officeDocument/2006/math" xmlns:a14="http://schemas.microsoft.com/office/drawing/2010/main" xmlns:ma14="http://schemas.microsoft.com/office/mac/drawingml/2011/main" val="1"/>
+              <ma14:wrappingTextBoxFlag xmlns:ma14="http://schemas.microsoft.com/office/mac/drawingml/2011/main" xmlns:a14="http://schemas.microsoft.com/office/drawing/2010/main" xmlns:m="http://schemas.openxmlformats.org/officeDocument/2006/math" xmlns="" val="1"/>
             </a:ext>
           </a:extLst>
         </p:spPr>
@@ -23337,7 +23544,7 @@
           </a:ln>
           <a:extLst>
             <a:ext uri="{C572A759-6A51-4108-AA02-DFA0A04FC94B}">
-              <ma14:wrappingTextBoxFlag xmlns="" xmlns:m="http://schemas.openxmlformats.org/officeDocument/2006/math" xmlns:a14="http://schemas.microsoft.com/office/drawing/2010/main" xmlns:ma14="http://schemas.microsoft.com/office/mac/drawingml/2011/main" val="1"/>
+              <ma14:wrappingTextBoxFlag xmlns:ma14="http://schemas.microsoft.com/office/mac/drawingml/2011/main" xmlns:a14="http://schemas.microsoft.com/office/drawing/2010/main" xmlns:m="http://schemas.openxmlformats.org/officeDocument/2006/math" xmlns="" val="1"/>
             </a:ext>
           </a:extLst>
         </p:spPr>
@@ -24107,6 +24314,7 @@
           <a:lstStyle/>
           <a:p>
             <a:r>
+              <a:rPr dirty="0"/>
               <a:t>Anonymous functions – Function Expressions </a:t>
             </a:r>
           </a:p>
@@ -24131,7 +24339,7 @@
           </a:ln>
           <a:extLst>
             <a:ext uri="{C572A759-6A51-4108-AA02-DFA0A04FC94B}">
-              <ma14:wrappingTextBoxFlag xmlns="" xmlns:m="http://schemas.openxmlformats.org/officeDocument/2006/math" xmlns:a14="http://schemas.microsoft.com/office/drawing/2010/main" xmlns:ma14="http://schemas.microsoft.com/office/mac/drawingml/2011/main" val="1"/>
+              <ma14:wrappingTextBoxFlag xmlns:ma14="http://schemas.microsoft.com/office/mac/drawingml/2011/main" xmlns:a14="http://schemas.microsoft.com/office/drawing/2010/main" xmlns:m="http://schemas.openxmlformats.org/officeDocument/2006/math" xmlns="" val="1"/>
             </a:ext>
           </a:extLst>
         </p:spPr>
@@ -24170,7 +24378,7 @@
           </a:ln>
           <a:extLst>
             <a:ext uri="{C572A759-6A51-4108-AA02-DFA0A04FC94B}">
-              <ma14:wrappingTextBoxFlag xmlns="" xmlns:m="http://schemas.openxmlformats.org/officeDocument/2006/math" xmlns:a14="http://schemas.microsoft.com/office/drawing/2010/main" xmlns:ma14="http://schemas.microsoft.com/office/mac/drawingml/2011/main" val="1"/>
+              <ma14:wrappingTextBoxFlag xmlns:ma14="http://schemas.microsoft.com/office/mac/drawingml/2011/main" xmlns:a14="http://schemas.microsoft.com/office/drawing/2010/main" xmlns:m="http://schemas.openxmlformats.org/officeDocument/2006/math" xmlns="" val="1"/>
             </a:ext>
           </a:extLst>
         </p:spPr>
@@ -24209,7 +24417,7 @@
           </a:ln>
           <a:extLst>
             <a:ext uri="{C572A759-6A51-4108-AA02-DFA0A04FC94B}">
-              <ma14:wrappingTextBoxFlag xmlns="" xmlns:m="http://schemas.openxmlformats.org/officeDocument/2006/math" xmlns:a14="http://schemas.microsoft.com/office/drawing/2010/main" xmlns:ma14="http://schemas.microsoft.com/office/mac/drawingml/2011/main" val="1"/>
+              <ma14:wrappingTextBoxFlag xmlns:ma14="http://schemas.microsoft.com/office/mac/drawingml/2011/main" xmlns:a14="http://schemas.microsoft.com/office/drawing/2010/main" xmlns:m="http://schemas.openxmlformats.org/officeDocument/2006/math" xmlns="" val="1"/>
             </a:ext>
           </a:extLst>
         </p:spPr>
@@ -24557,6 +24765,7 @@
           <a:lstStyle/>
           <a:p>
             <a:r>
+              <a:rPr dirty="0"/>
               <a:t>IIFE</a:t>
             </a:r>
           </a:p>
@@ -24581,7 +24790,7 @@
           </a:ln>
           <a:extLst>
             <a:ext uri="{C572A759-6A51-4108-AA02-DFA0A04FC94B}">
-              <ma14:wrappingTextBoxFlag xmlns="" xmlns:m="http://schemas.openxmlformats.org/officeDocument/2006/math" xmlns:a14="http://schemas.microsoft.com/office/drawing/2010/main" xmlns:ma14="http://schemas.microsoft.com/office/mac/drawingml/2011/main" val="1"/>
+              <ma14:wrappingTextBoxFlag xmlns:ma14="http://schemas.microsoft.com/office/mac/drawingml/2011/main" xmlns:a14="http://schemas.microsoft.com/office/drawing/2010/main" xmlns:m="http://schemas.openxmlformats.org/officeDocument/2006/math" xmlns="" val="1"/>
             </a:ext>
           </a:extLst>
         </p:spPr>
@@ -24620,7 +24829,7 @@
           </a:ln>
           <a:extLst>
             <a:ext uri="{C572A759-6A51-4108-AA02-DFA0A04FC94B}">
-              <ma14:wrappingTextBoxFlag xmlns="" xmlns:m="http://schemas.openxmlformats.org/officeDocument/2006/math" xmlns:a14="http://schemas.microsoft.com/office/drawing/2010/main" xmlns:ma14="http://schemas.microsoft.com/office/mac/drawingml/2011/main" val="1"/>
+              <ma14:wrappingTextBoxFlag xmlns:ma14="http://schemas.microsoft.com/office/mac/drawingml/2011/main" xmlns:a14="http://schemas.microsoft.com/office/drawing/2010/main" xmlns:m="http://schemas.openxmlformats.org/officeDocument/2006/math" xmlns="" val="1"/>
             </a:ext>
           </a:extLst>
         </p:spPr>
@@ -25006,6 +25215,7 @@
           <a:lstStyle/>
           <a:p>
             <a:r>
+              <a:rPr dirty="0"/>
               <a:t>Passing function to another function</a:t>
             </a:r>
           </a:p>
@@ -25030,7 +25240,7 @@
           </a:ln>
           <a:extLst>
             <a:ext uri="{C572A759-6A51-4108-AA02-DFA0A04FC94B}">
-              <ma14:wrappingTextBoxFlag xmlns="" xmlns:m="http://schemas.openxmlformats.org/officeDocument/2006/math" xmlns:a14="http://schemas.microsoft.com/office/drawing/2010/main" xmlns:ma14="http://schemas.microsoft.com/office/mac/drawingml/2011/main" val="1"/>
+              <ma14:wrappingTextBoxFlag xmlns:ma14="http://schemas.microsoft.com/office/mac/drawingml/2011/main" xmlns:a14="http://schemas.microsoft.com/office/drawing/2010/main" xmlns:m="http://schemas.openxmlformats.org/officeDocument/2006/math" xmlns="" val="1"/>
             </a:ext>
           </a:extLst>
         </p:spPr>
@@ -25104,7 +25314,7 @@
           </a:ln>
           <a:extLst>
             <a:ext uri="{C572A759-6A51-4108-AA02-DFA0A04FC94B}">
-              <ma14:wrappingTextBoxFlag xmlns="" xmlns:m="http://schemas.openxmlformats.org/officeDocument/2006/math" xmlns:a14="http://schemas.microsoft.com/office/drawing/2010/main" xmlns:ma14="http://schemas.microsoft.com/office/mac/drawingml/2011/main" val="1"/>
+              <ma14:wrappingTextBoxFlag xmlns:ma14="http://schemas.microsoft.com/office/mac/drawingml/2011/main" xmlns:a14="http://schemas.microsoft.com/office/drawing/2010/main" xmlns:m="http://schemas.openxmlformats.org/officeDocument/2006/math" xmlns="" val="1"/>
             </a:ext>
           </a:extLst>
         </p:spPr>
@@ -25197,6 +25407,7 @@
           <a:lstStyle/>
           <a:p>
             <a:r>
+              <a:rPr dirty="0"/>
               <a:t>Task for callback</a:t>
             </a:r>
           </a:p>
@@ -25221,7 +25432,7 @@
           </a:ln>
           <a:extLst>
             <a:ext uri="{C572A759-6A51-4108-AA02-DFA0A04FC94B}">
-              <ma14:wrappingTextBoxFlag xmlns="" xmlns:m="http://schemas.openxmlformats.org/officeDocument/2006/math" xmlns:a14="http://schemas.microsoft.com/office/drawing/2010/main" xmlns:ma14="http://schemas.microsoft.com/office/mac/drawingml/2011/main" val="1"/>
+              <ma14:wrappingTextBoxFlag xmlns:ma14="http://schemas.microsoft.com/office/mac/drawingml/2011/main" xmlns:a14="http://schemas.microsoft.com/office/drawing/2010/main" xmlns:m="http://schemas.openxmlformats.org/officeDocument/2006/math" xmlns="" val="1"/>
             </a:ext>
           </a:extLst>
         </p:spPr>
@@ -25347,6 +25558,7 @@
           <a:lstStyle/>
           <a:p>
             <a:r>
+              <a:rPr dirty="0"/>
               <a:t>Return a function from another function</a:t>
             </a:r>
           </a:p>
@@ -25371,7 +25583,7 @@
           </a:ln>
           <a:extLst>
             <a:ext uri="{C572A759-6A51-4108-AA02-DFA0A04FC94B}">
-              <ma14:wrappingTextBoxFlag xmlns="" xmlns:m="http://schemas.openxmlformats.org/officeDocument/2006/math" xmlns:a14="http://schemas.microsoft.com/office/drawing/2010/main" xmlns:ma14="http://schemas.microsoft.com/office/mac/drawingml/2011/main" val="1"/>
+              <ma14:wrappingTextBoxFlag xmlns:ma14="http://schemas.microsoft.com/office/mac/drawingml/2011/main" xmlns:a14="http://schemas.microsoft.com/office/drawing/2010/main" xmlns:m="http://schemas.openxmlformats.org/officeDocument/2006/math" xmlns="" val="1"/>
             </a:ext>
           </a:extLst>
         </p:spPr>
@@ -25455,7 +25667,7 @@
           </a:ln>
           <a:extLst>
             <a:ext uri="{C572A759-6A51-4108-AA02-DFA0A04FC94B}">
-              <ma14:wrappingTextBoxFlag xmlns="" xmlns:m="http://schemas.openxmlformats.org/officeDocument/2006/math" xmlns:a14="http://schemas.microsoft.com/office/drawing/2010/main" xmlns:ma14="http://schemas.microsoft.com/office/mac/drawingml/2011/main" val="1"/>
+              <ma14:wrappingTextBoxFlag xmlns:ma14="http://schemas.microsoft.com/office/mac/drawingml/2011/main" xmlns:a14="http://schemas.microsoft.com/office/drawing/2010/main" xmlns:m="http://schemas.openxmlformats.org/officeDocument/2006/math" xmlns="" val="1"/>
             </a:ext>
           </a:extLst>
         </p:spPr>
@@ -25580,11 +25792,13 @@
           <a:lstStyle/>
           <a:p>
             <a:r>
+              <a:rPr dirty="0"/>
               <a:t>Upload to git </a:t>
             </a:r>
           </a:p>
           <a:p>
             <a:r>
+              <a:rPr dirty="0"/>
               <a:t>Warmup tasks</a:t>
             </a:r>
           </a:p>
@@ -25596,7 +25810,7 @@
               <a:defRPr sz="2400"/>
             </a:pPr>
             <a:r>
-              <a:rPr u="sng">
+              <a:rPr u="sng" dirty="0">
                 <a:solidFill>
                   <a:srgbClr val="0563C1"/>
                 </a:solidFill>
@@ -26004,7 +26218,7 @@
             <a:effectLst/>
             <a:extLst>
               <a:ext uri="{C572A759-6A51-4108-AA02-DFA0A04FC94B}">
-                <ma14:wrappingTextBoxFlag xmlns="" xmlns:m="http://schemas.openxmlformats.org/officeDocument/2006/math" xmlns:a14="http://schemas.microsoft.com/office/drawing/2010/main" xmlns:ma14="http://schemas.microsoft.com/office/mac/drawingml/2011/main" val="1"/>
+                <ma14:wrappingTextBoxFlag xmlns:ma14="http://schemas.microsoft.com/office/mac/drawingml/2011/main" xmlns:a14="http://schemas.microsoft.com/office/drawing/2010/main" xmlns:m="http://schemas.openxmlformats.org/officeDocument/2006/math" xmlns="" val="1"/>
               </a:ext>
             </a:extLst>
           </p:spPr>
@@ -26083,7 +26297,7 @@
           </a:ln>
           <a:extLst>
             <a:ext uri="{C572A759-6A51-4108-AA02-DFA0A04FC94B}">
-              <ma14:wrappingTextBoxFlag xmlns="" xmlns:m="http://schemas.openxmlformats.org/officeDocument/2006/math" xmlns:a14="http://schemas.microsoft.com/office/drawing/2010/main" xmlns:ma14="http://schemas.microsoft.com/office/mac/drawingml/2011/main" val="1"/>
+              <ma14:wrappingTextBoxFlag xmlns:ma14="http://schemas.microsoft.com/office/mac/drawingml/2011/main" xmlns:a14="http://schemas.microsoft.com/office/drawing/2010/main" xmlns:m="http://schemas.openxmlformats.org/officeDocument/2006/math" xmlns="" val="1"/>
             </a:ext>
           </a:extLst>
         </p:spPr>
@@ -26156,7 +26370,7 @@
           </a:ln>
           <a:extLst>
             <a:ext uri="{C572A759-6A51-4108-AA02-DFA0A04FC94B}">
-              <ma14:wrappingTextBoxFlag xmlns="" xmlns:m="http://schemas.openxmlformats.org/officeDocument/2006/math" xmlns:a14="http://schemas.microsoft.com/office/drawing/2010/main" xmlns:ma14="http://schemas.microsoft.com/office/mac/drawingml/2011/main" val="1"/>
+              <ma14:wrappingTextBoxFlag xmlns:ma14="http://schemas.microsoft.com/office/mac/drawingml/2011/main" xmlns:a14="http://schemas.microsoft.com/office/drawing/2010/main" xmlns:m="http://schemas.openxmlformats.org/officeDocument/2006/math" xmlns="" val="1"/>
             </a:ext>
           </a:extLst>
         </p:spPr>
@@ -26842,7 +27056,7 @@
           </a:ln>
           <a:extLst>
             <a:ext uri="{C572A759-6A51-4108-AA02-DFA0A04FC94B}">
-              <ma14:wrappingTextBoxFlag xmlns="" xmlns:m="http://schemas.openxmlformats.org/officeDocument/2006/math" xmlns:a14="http://schemas.microsoft.com/office/drawing/2010/main" xmlns:ma14="http://schemas.microsoft.com/office/mac/drawingml/2011/main" val="1"/>
+              <ma14:wrappingTextBoxFlag xmlns:ma14="http://schemas.microsoft.com/office/mac/drawingml/2011/main" xmlns:a14="http://schemas.microsoft.com/office/drawing/2010/main" xmlns:m="http://schemas.openxmlformats.org/officeDocument/2006/math" xmlns="" val="1"/>
             </a:ext>
           </a:extLst>
         </p:spPr>
@@ -26892,7 +27106,7 @@
           </a:ln>
           <a:extLst>
             <a:ext uri="{C572A759-6A51-4108-AA02-DFA0A04FC94B}">
-              <ma14:wrappingTextBoxFlag xmlns="" xmlns:m="http://schemas.openxmlformats.org/officeDocument/2006/math" xmlns:a14="http://schemas.microsoft.com/office/drawing/2010/main" xmlns:ma14="http://schemas.microsoft.com/office/mac/drawingml/2011/main" val="1"/>
+              <ma14:wrappingTextBoxFlag xmlns:ma14="http://schemas.microsoft.com/office/mac/drawingml/2011/main" xmlns:a14="http://schemas.microsoft.com/office/drawing/2010/main" xmlns:m="http://schemas.openxmlformats.org/officeDocument/2006/math" xmlns="" val="1"/>
             </a:ext>
           </a:extLst>
         </p:spPr>
@@ -26951,7 +27165,7 @@
           </a:ln>
           <a:extLst>
             <a:ext uri="{C572A759-6A51-4108-AA02-DFA0A04FC94B}">
-              <ma14:wrappingTextBoxFlag xmlns="" xmlns:m="http://schemas.openxmlformats.org/officeDocument/2006/math" xmlns:a14="http://schemas.microsoft.com/office/drawing/2010/main" xmlns:ma14="http://schemas.microsoft.com/office/mac/drawingml/2011/main" val="1"/>
+              <ma14:wrappingTextBoxFlag xmlns:ma14="http://schemas.microsoft.com/office/mac/drawingml/2011/main" xmlns:a14="http://schemas.microsoft.com/office/drawing/2010/main" xmlns:m="http://schemas.openxmlformats.org/officeDocument/2006/math" xmlns="" val="1"/>
             </a:ext>
           </a:extLst>
         </p:spPr>
@@ -27189,7 +27403,7 @@
           </a:ln>
           <a:extLst>
             <a:ext uri="{C572A759-6A51-4108-AA02-DFA0A04FC94B}">
-              <ma14:wrappingTextBoxFlag xmlns="" xmlns:m="http://schemas.openxmlformats.org/officeDocument/2006/math" xmlns:a14="http://schemas.microsoft.com/office/drawing/2010/main" xmlns:ma14="http://schemas.microsoft.com/office/mac/drawingml/2011/main" val="1"/>
+              <ma14:wrappingTextBoxFlag xmlns:ma14="http://schemas.microsoft.com/office/mac/drawingml/2011/main" xmlns:a14="http://schemas.microsoft.com/office/drawing/2010/main" xmlns:m="http://schemas.openxmlformats.org/officeDocument/2006/math" xmlns="" val="1"/>
             </a:ext>
           </a:extLst>
         </p:spPr>
@@ -27285,7 +27499,7 @@
           </a:ln>
           <a:extLst>
             <a:ext uri="{C572A759-6A51-4108-AA02-DFA0A04FC94B}">
-              <ma14:wrappingTextBoxFlag xmlns="" xmlns:m="http://schemas.openxmlformats.org/officeDocument/2006/math" xmlns:a14="http://schemas.microsoft.com/office/drawing/2010/main" xmlns:ma14="http://schemas.microsoft.com/office/mac/drawingml/2011/main" val="1"/>
+              <ma14:wrappingTextBoxFlag xmlns:ma14="http://schemas.microsoft.com/office/mac/drawingml/2011/main" xmlns:a14="http://schemas.microsoft.com/office/drawing/2010/main" xmlns:m="http://schemas.openxmlformats.org/officeDocument/2006/math" xmlns="" val="1"/>
             </a:ext>
           </a:extLst>
         </p:spPr>
@@ -27324,7 +27538,7 @@
           </a:ln>
           <a:extLst>
             <a:ext uri="{C572A759-6A51-4108-AA02-DFA0A04FC94B}">
-              <ma14:wrappingTextBoxFlag xmlns="" xmlns:m="http://schemas.openxmlformats.org/officeDocument/2006/math" xmlns:a14="http://schemas.microsoft.com/office/drawing/2010/main" xmlns:ma14="http://schemas.microsoft.com/office/mac/drawingml/2011/main" val="1"/>
+              <ma14:wrappingTextBoxFlag xmlns:ma14="http://schemas.microsoft.com/office/mac/drawingml/2011/main" xmlns:a14="http://schemas.microsoft.com/office/drawing/2010/main" xmlns:m="http://schemas.openxmlformats.org/officeDocument/2006/math" xmlns="" val="1"/>
             </a:ext>
           </a:extLst>
         </p:spPr>
@@ -27357,7 +27571,7 @@
           </a:ln>
           <a:extLst>
             <a:ext uri="{C572A759-6A51-4108-AA02-DFA0A04FC94B}">
-              <ma14:wrappingTextBoxFlag xmlns="" xmlns:m="http://schemas.openxmlformats.org/officeDocument/2006/math" xmlns:a14="http://schemas.microsoft.com/office/drawing/2010/main" xmlns:ma14="http://schemas.microsoft.com/office/mac/drawingml/2011/main" val="1"/>
+              <ma14:wrappingTextBoxFlag xmlns:ma14="http://schemas.microsoft.com/office/mac/drawingml/2011/main" xmlns:a14="http://schemas.microsoft.com/office/drawing/2010/main" xmlns:m="http://schemas.openxmlformats.org/officeDocument/2006/math" xmlns="" val="1"/>
             </a:ext>
           </a:extLst>
         </p:spPr>
@@ -27397,7 +27611,7 @@
           </a:ln>
           <a:extLst>
             <a:ext uri="{C572A759-6A51-4108-AA02-DFA0A04FC94B}">
-              <ma14:wrappingTextBoxFlag xmlns="" xmlns:m="http://schemas.openxmlformats.org/officeDocument/2006/math" xmlns:a14="http://schemas.microsoft.com/office/drawing/2010/main" xmlns:ma14="http://schemas.microsoft.com/office/mac/drawingml/2011/main" val="1"/>
+              <ma14:wrappingTextBoxFlag xmlns:ma14="http://schemas.microsoft.com/office/mac/drawingml/2011/main" xmlns:a14="http://schemas.microsoft.com/office/drawing/2010/main" xmlns:m="http://schemas.openxmlformats.org/officeDocument/2006/math" xmlns="" val="1"/>
             </a:ext>
           </a:extLst>
         </p:spPr>
@@ -28011,7 +28225,7 @@
             <a:effectLst/>
             <a:extLst>
               <a:ext uri="{C572A759-6A51-4108-AA02-DFA0A04FC94B}">
-                <ma14:wrappingTextBoxFlag xmlns="" xmlns:m="http://schemas.openxmlformats.org/officeDocument/2006/math" xmlns:a14="http://schemas.microsoft.com/office/drawing/2010/main" xmlns:ma14="http://schemas.microsoft.com/office/mac/drawingml/2011/main" val="1"/>
+                <ma14:wrappingTextBoxFlag xmlns:ma14="http://schemas.microsoft.com/office/mac/drawingml/2011/main" xmlns:a14="http://schemas.microsoft.com/office/drawing/2010/main" xmlns:m="http://schemas.openxmlformats.org/officeDocument/2006/math" xmlns="" val="1"/>
               </a:ext>
             </a:extLst>
           </p:spPr>
@@ -28090,7 +28304,7 @@
           </a:ln>
           <a:extLst>
             <a:ext uri="{C572A759-6A51-4108-AA02-DFA0A04FC94B}">
-              <ma14:wrappingTextBoxFlag xmlns="" xmlns:m="http://schemas.openxmlformats.org/officeDocument/2006/math" xmlns:a14="http://schemas.microsoft.com/office/drawing/2010/main" xmlns:ma14="http://schemas.microsoft.com/office/mac/drawingml/2011/main" val="1"/>
+              <ma14:wrappingTextBoxFlag xmlns:ma14="http://schemas.microsoft.com/office/mac/drawingml/2011/main" xmlns:a14="http://schemas.microsoft.com/office/drawing/2010/main" xmlns:m="http://schemas.openxmlformats.org/officeDocument/2006/math" xmlns="" val="1"/>
             </a:ext>
           </a:extLst>
         </p:spPr>
@@ -28163,7 +28377,7 @@
           </a:ln>
           <a:extLst>
             <a:ext uri="{C572A759-6A51-4108-AA02-DFA0A04FC94B}">
-              <ma14:wrappingTextBoxFlag xmlns="" xmlns:m="http://schemas.openxmlformats.org/officeDocument/2006/math" xmlns:a14="http://schemas.microsoft.com/office/drawing/2010/main" xmlns:ma14="http://schemas.microsoft.com/office/mac/drawingml/2011/main" val="1"/>
+              <ma14:wrappingTextBoxFlag xmlns:ma14="http://schemas.microsoft.com/office/mac/drawingml/2011/main" xmlns:a14="http://schemas.microsoft.com/office/drawing/2010/main" xmlns:m="http://schemas.openxmlformats.org/officeDocument/2006/math" xmlns="" val="1"/>
             </a:ext>
           </a:extLst>
         </p:spPr>
@@ -28365,7 +28579,7 @@
           </a:ln>
           <a:extLst>
             <a:ext uri="{C572A759-6A51-4108-AA02-DFA0A04FC94B}">
-              <ma14:wrappingTextBoxFlag xmlns="" xmlns:m="http://schemas.openxmlformats.org/officeDocument/2006/math" xmlns:a14="http://schemas.microsoft.com/office/drawing/2010/main" xmlns:ma14="http://schemas.microsoft.com/office/mac/drawingml/2011/main" val="1"/>
+              <ma14:wrappingTextBoxFlag xmlns:ma14="http://schemas.microsoft.com/office/mac/drawingml/2011/main" xmlns:a14="http://schemas.microsoft.com/office/drawing/2010/main" xmlns:m="http://schemas.openxmlformats.org/officeDocument/2006/math" xmlns="" val="1"/>
             </a:ext>
           </a:extLst>
         </p:spPr>
@@ -28493,7 +28707,7 @@
           </a:ln>
           <a:extLst>
             <a:ext uri="{C572A759-6A51-4108-AA02-DFA0A04FC94B}">
-              <ma14:wrappingTextBoxFlag xmlns="" xmlns:m="http://schemas.openxmlformats.org/officeDocument/2006/math" xmlns:a14="http://schemas.microsoft.com/office/drawing/2010/main" xmlns:ma14="http://schemas.microsoft.com/office/mac/drawingml/2011/main" val="1"/>
+              <ma14:wrappingTextBoxFlag xmlns:ma14="http://schemas.microsoft.com/office/mac/drawingml/2011/main" xmlns:a14="http://schemas.microsoft.com/office/drawing/2010/main" xmlns:m="http://schemas.openxmlformats.org/officeDocument/2006/math" xmlns="" val="1"/>
             </a:ext>
           </a:extLst>
         </p:spPr>
@@ -28532,7 +28746,7 @@
           </a:ln>
           <a:extLst>
             <a:ext uri="{C572A759-6A51-4108-AA02-DFA0A04FC94B}">
-              <ma14:wrappingTextBoxFlag xmlns="" xmlns:m="http://schemas.openxmlformats.org/officeDocument/2006/math" xmlns:a14="http://schemas.microsoft.com/office/drawing/2010/main" xmlns:ma14="http://schemas.microsoft.com/office/mac/drawingml/2011/main" val="1"/>
+              <ma14:wrappingTextBoxFlag xmlns:ma14="http://schemas.microsoft.com/office/mac/drawingml/2011/main" xmlns:a14="http://schemas.microsoft.com/office/drawing/2010/main" xmlns:m="http://schemas.openxmlformats.org/officeDocument/2006/math" xmlns="" val="1"/>
             </a:ext>
           </a:extLst>
         </p:spPr>
@@ -28602,7 +28816,7 @@
           </a:ln>
           <a:extLst>
             <a:ext uri="{C572A759-6A51-4108-AA02-DFA0A04FC94B}">
-              <ma14:wrappingTextBoxFlag xmlns="" xmlns:m="http://schemas.openxmlformats.org/officeDocument/2006/math" xmlns:a14="http://schemas.microsoft.com/office/drawing/2010/main" xmlns:ma14="http://schemas.microsoft.com/office/mac/drawingml/2011/main" val="1"/>
+              <ma14:wrappingTextBoxFlag xmlns:ma14="http://schemas.microsoft.com/office/mac/drawingml/2011/main" xmlns:a14="http://schemas.microsoft.com/office/drawing/2010/main" xmlns:m="http://schemas.openxmlformats.org/officeDocument/2006/math" xmlns="" val="1"/>
             </a:ext>
           </a:extLst>
         </p:spPr>
@@ -29025,7 +29239,7 @@
           </a:ln>
           <a:extLst>
             <a:ext uri="{C572A759-6A51-4108-AA02-DFA0A04FC94B}">
-              <ma14:wrappingTextBoxFlag xmlns="" xmlns:m="http://schemas.openxmlformats.org/officeDocument/2006/math" xmlns:a14="http://schemas.microsoft.com/office/drawing/2010/main" xmlns:ma14="http://schemas.microsoft.com/office/mac/drawingml/2011/main" val="1"/>
+              <ma14:wrappingTextBoxFlag xmlns:ma14="http://schemas.microsoft.com/office/mac/drawingml/2011/main" xmlns:a14="http://schemas.microsoft.com/office/drawing/2010/main" xmlns:m="http://schemas.openxmlformats.org/officeDocument/2006/math" xmlns="" val="1"/>
             </a:ext>
           </a:extLst>
         </p:spPr>
@@ -29066,7 +29280,7 @@
           </a:ln>
           <a:extLst>
             <a:ext uri="{C572A759-6A51-4108-AA02-DFA0A04FC94B}">
-              <ma14:wrappingTextBoxFlag xmlns="" xmlns:m="http://schemas.openxmlformats.org/officeDocument/2006/math" xmlns:a14="http://schemas.microsoft.com/office/drawing/2010/main" xmlns:ma14="http://schemas.microsoft.com/office/mac/drawingml/2011/main" val="1"/>
+              <ma14:wrappingTextBoxFlag xmlns:ma14="http://schemas.microsoft.com/office/mac/drawingml/2011/main" xmlns:a14="http://schemas.microsoft.com/office/drawing/2010/main" xmlns:m="http://schemas.openxmlformats.org/officeDocument/2006/math" xmlns="" val="1"/>
             </a:ext>
           </a:extLst>
         </p:spPr>
@@ -29117,7 +29331,7 @@
           </a:ln>
           <a:extLst>
             <a:ext uri="{C572A759-6A51-4108-AA02-DFA0A04FC94B}">
-              <ma14:wrappingTextBoxFlag xmlns="" xmlns:m="http://schemas.openxmlformats.org/officeDocument/2006/math" xmlns:a14="http://schemas.microsoft.com/office/drawing/2010/main" xmlns:ma14="http://schemas.microsoft.com/office/mac/drawingml/2011/main" val="1"/>
+              <ma14:wrappingTextBoxFlag xmlns:ma14="http://schemas.microsoft.com/office/mac/drawingml/2011/main" xmlns:a14="http://schemas.microsoft.com/office/drawing/2010/main" xmlns:m="http://schemas.openxmlformats.org/officeDocument/2006/math" xmlns="" val="1"/>
             </a:ext>
           </a:extLst>
         </p:spPr>

</xml_diff>